<commit_message>
Maceget V0.3: Simulator section
Signed-off-by: Andrey Shamis <lolnik@gmail.com>
</commit_message>
<xml_diff>
--- a/מצגת התקדמות.pptx
+++ b/מצגת התקדמות.pptx
@@ -5,7 +5,7 @@
     <p:sldMasterId id="2147483672" r:id="rId1"/>
   </p:sldMasterIdLst>
   <p:notesMasterIdLst>
-    <p:notesMasterId r:id="rId21"/>
+    <p:notesMasterId r:id="rId24"/>
   </p:notesMasterIdLst>
   <p:sldIdLst>
     <p:sldId id="256" r:id="rId2"/>
@@ -18,15 +18,18 @@
     <p:sldId id="268" r:id="rId9"/>
     <p:sldId id="269" r:id="rId10"/>
     <p:sldId id="270" r:id="rId11"/>
-    <p:sldId id="271" r:id="rId12"/>
-    <p:sldId id="272" r:id="rId13"/>
-    <p:sldId id="273" r:id="rId14"/>
-    <p:sldId id="274" r:id="rId15"/>
-    <p:sldId id="275" r:id="rId16"/>
-    <p:sldId id="276" r:id="rId17"/>
-    <p:sldId id="262" r:id="rId18"/>
-    <p:sldId id="263" r:id="rId19"/>
-    <p:sldId id="264" r:id="rId20"/>
+    <p:sldId id="277" r:id="rId12"/>
+    <p:sldId id="278" r:id="rId13"/>
+    <p:sldId id="280" r:id="rId14"/>
+    <p:sldId id="271" r:id="rId15"/>
+    <p:sldId id="272" r:id="rId16"/>
+    <p:sldId id="273" r:id="rId17"/>
+    <p:sldId id="274" r:id="rId18"/>
+    <p:sldId id="275" r:id="rId19"/>
+    <p:sldId id="276" r:id="rId20"/>
+    <p:sldId id="262" r:id="rId21"/>
+    <p:sldId id="263" r:id="rId22"/>
+    <p:sldId id="264" r:id="rId23"/>
   </p:sldIdLst>
   <p:sldSz cx="9144000" cy="6858000" type="screen4x3"/>
   <p:notesSz cx="6858000" cy="9144000"/>
@@ -210,7 +213,7 @@
           <a:p>
             <a:fld id="{5C90FD31-B673-4764-A46F-AA367EDFFC51}" type="datetimeFigureOut">
               <a:rPr lang="en-US" smtClean="0"/>
-              <a:t>2/5/2013</a:t>
+              <a:t>2/8/2013</a:t>
             </a:fld>
             <a:endParaRPr lang="en-US"/>
           </a:p>
@@ -2244,7 +2247,7 @@
           <a:p>
             <a:fld id="{4BD8E522-60E3-4197-854A-59687A623685}" type="slidenum">
               <a:rPr lang="en-US" smtClean="0"/>
-              <a:t>17</a:t>
+              <a:t>20</a:t>
             </a:fld>
             <a:endParaRPr lang="en-US"/>
           </a:p>
@@ -2333,7 +2336,7 @@
           <a:p>
             <a:fld id="{4BD8E522-60E3-4197-854A-59687A623685}" type="slidenum">
               <a:rPr lang="en-US" smtClean="0"/>
-              <a:t>18</a:t>
+              <a:t>21</a:t>
             </a:fld>
             <a:endParaRPr lang="en-US"/>
           </a:p>
@@ -2461,7 +2464,7 @@
           <a:p>
             <a:fld id="{4BD8E522-60E3-4197-854A-59687A623685}" type="slidenum">
               <a:rPr lang="en-US" smtClean="0"/>
-              <a:t>19</a:t>
+              <a:t>22</a:t>
             </a:fld>
             <a:endParaRPr lang="en-US"/>
           </a:p>
@@ -2552,7 +2555,7 @@
             <a:fld id="{1D8BD707-D9CF-40AE-B4C6-C98DA3205C09}" type="datetimeFigureOut">
               <a:rPr lang="en-US" smtClean="0"/>
               <a:pPr/>
-              <a:t>2/5/2013</a:t>
+              <a:t>2/8/2013</a:t>
             </a:fld>
             <a:endParaRPr lang="en-US"/>
           </a:p>
@@ -3079,7 +3082,7 @@
             <a:fld id="{1D8BD707-D9CF-40AE-B4C6-C98DA3205C09}" type="datetimeFigureOut">
               <a:rPr lang="en-US" smtClean="0"/>
               <a:pPr/>
-              <a:t>2/5/2013</a:t>
+              <a:t>2/8/2013</a:t>
             </a:fld>
             <a:endParaRPr lang="en-US"/>
           </a:p>
@@ -3395,7 +3398,7 @@
             <a:fld id="{1D8BD707-D9CF-40AE-B4C6-C98DA3205C09}" type="datetimeFigureOut">
               <a:rPr lang="en-US" smtClean="0"/>
               <a:pPr/>
-              <a:t>2/5/2013</a:t>
+              <a:t>2/8/2013</a:t>
             </a:fld>
             <a:endParaRPr lang="en-US"/>
           </a:p>
@@ -3683,7 +3686,7 @@
             <a:fld id="{1D8BD707-D9CF-40AE-B4C6-C98DA3205C09}" type="datetimeFigureOut">
               <a:rPr lang="en-US" smtClean="0"/>
               <a:pPr/>
-              <a:t>2/5/2013</a:t>
+              <a:t>2/8/2013</a:t>
             </a:fld>
             <a:endParaRPr lang="en-US"/>
           </a:p>
@@ -4260,7 +4263,7 @@
             <a:fld id="{1D8BD707-D9CF-40AE-B4C6-C98DA3205C09}" type="datetimeFigureOut">
               <a:rPr lang="en-US" smtClean="0"/>
               <a:pPr/>
-              <a:t>2/5/2013</a:t>
+              <a:t>2/8/2013</a:t>
             </a:fld>
             <a:endParaRPr lang="en-US"/>
           </a:p>
@@ -4352,7 +4355,7 @@
             <a:fld id="{1D8BD707-D9CF-40AE-B4C6-C98DA3205C09}" type="datetimeFigureOut">
               <a:rPr lang="en-US" smtClean="0"/>
               <a:pPr/>
-              <a:t>2/5/2013</a:t>
+              <a:t>2/8/2013</a:t>
             </a:fld>
             <a:endParaRPr lang="en-US"/>
           </a:p>
@@ -5063,7 +5066,7 @@
             <a:fld id="{1D8BD707-D9CF-40AE-B4C6-C98DA3205C09}" type="datetimeFigureOut">
               <a:rPr lang="en-US" smtClean="0"/>
               <a:pPr/>
-              <a:t>2/5/2013</a:t>
+              <a:t>2/8/2013</a:t>
             </a:fld>
             <a:endParaRPr lang="en-US"/>
           </a:p>
@@ -5317,7 +5320,7 @@
             <a:fld id="{1D8BD707-D9CF-40AE-B4C6-C98DA3205C09}" type="datetimeFigureOut">
               <a:rPr lang="en-US" smtClean="0"/>
               <a:pPr/>
-              <a:t>2/5/2013</a:t>
+              <a:t>2/8/2013</a:t>
             </a:fld>
             <a:endParaRPr lang="en-US"/>
           </a:p>
@@ -5548,7 +5551,7 @@
             <a:fld id="{1D8BD707-D9CF-40AE-B4C6-C98DA3205C09}" type="datetimeFigureOut">
               <a:rPr lang="en-US" smtClean="0"/>
               <a:pPr/>
-              <a:t>2/5/2013</a:t>
+              <a:t>2/8/2013</a:t>
             </a:fld>
             <a:endParaRPr lang="en-US"/>
           </a:p>
@@ -5824,7 +5827,7 @@
             <a:fld id="{1D8BD707-D9CF-40AE-B4C6-C98DA3205C09}" type="datetimeFigureOut">
               <a:rPr lang="en-US" smtClean="0"/>
               <a:pPr/>
-              <a:t>2/5/2013</a:t>
+              <a:t>2/8/2013</a:t>
             </a:fld>
             <a:endParaRPr lang="en-US"/>
           </a:p>
@@ -6112,7 +6115,7 @@
             <a:fld id="{1D8BD707-D9CF-40AE-B4C6-C98DA3205C09}" type="datetimeFigureOut">
               <a:rPr lang="en-US" smtClean="0"/>
               <a:pPr/>
-              <a:t>2/5/2013</a:t>
+              <a:t>2/8/2013</a:t>
             </a:fld>
             <a:endParaRPr lang="en-US"/>
           </a:p>
@@ -6382,7 +6385,7 @@
             <a:fld id="{1D8BD707-D9CF-40AE-B4C6-C98DA3205C09}" type="datetimeFigureOut">
               <a:rPr lang="en-US" smtClean="0"/>
               <a:pPr/>
-              <a:t>2/5/2013</a:t>
+              <a:t>2/8/2013</a:t>
             </a:fld>
             <a:endParaRPr lang="en-US"/>
           </a:p>
@@ -7049,17 +7052,127 @@
         </p:nvSpPr>
         <p:spPr>
           <a:xfrm>
-            <a:off x="699247" y="3505200"/>
-            <a:ext cx="7745505" cy="2620962"/>
+            <a:off x="699247" y="2819400"/>
+            <a:ext cx="7745505" cy="3306762"/>
           </a:xfrm>
         </p:spPr>
         <p:txBody>
           <a:bodyPr/>
           <a:lstStyle/>
           <a:p>
-            <a:pPr marL="0" indent="0" algn="r" rtl="1">
+            <a:pPr marL="0" indent="0">
               <a:buNone/>
             </a:pPr>
+            <a:r>
+              <a:rPr lang="en-US" b="1" cap="all" dirty="0" smtClean="0">
+                <a:ln w="9000" cmpd="sng">
+                  <a:solidFill>
+                    <a:schemeClr val="accent4">
+                      <a:shade val="50000"/>
+                      <a:satMod val="120000"/>
+                    </a:schemeClr>
+                  </a:solidFill>
+                  <a:prstDash val="solid"/>
+                </a:ln>
+                <a:gradFill>
+                  <a:gsLst>
+                    <a:gs pos="0">
+                      <a:schemeClr val="accent4">
+                        <a:shade val="20000"/>
+                        <a:satMod val="245000"/>
+                      </a:schemeClr>
+                    </a:gs>
+                    <a:gs pos="43000">
+                      <a:schemeClr val="accent4">
+                        <a:satMod val="255000"/>
+                      </a:schemeClr>
+                    </a:gs>
+                    <a:gs pos="48000">
+                      <a:schemeClr val="accent4">
+                        <a:shade val="85000"/>
+                        <a:satMod val="255000"/>
+                      </a:schemeClr>
+                    </a:gs>
+                    <a:gs pos="100000">
+                      <a:schemeClr val="accent4">
+                        <a:shade val="20000"/>
+                        <a:satMod val="245000"/>
+                      </a:schemeClr>
+                    </a:gs>
+                  </a:gsLst>
+                  <a:lin ang="5400000"/>
+                </a:gradFill>
+                <a:effectLst>
+                  <a:reflection blurRad="12700" stA="28000" endPos="45000" dist="1000" dir="5400000" sy="-100000" algn="bl" rotWithShape="0"/>
+                </a:effectLst>
+              </a:rPr>
+              <a:t> Presenter - GUI</a:t>
+            </a:r>
+          </a:p>
+          <a:p>
+            <a:pPr lvl="1">
+              <a:buFont typeface="Wingdings" pitchFamily="2" charset="2"/>
+              <a:buChar char="ü"/>
+            </a:pPr>
+            <a:r>
+              <a:rPr lang="en-US" dirty="0" smtClean="0"/>
+              <a:t>Show devices on map</a:t>
+            </a:r>
+          </a:p>
+          <a:p>
+            <a:pPr lvl="1">
+              <a:buFont typeface="Wingdings" pitchFamily="2" charset="2"/>
+              <a:buChar char="ü"/>
+            </a:pPr>
+            <a:r>
+              <a:rPr lang="en-US" dirty="0" smtClean="0"/>
+              <a:t>Show devices radius </a:t>
+            </a:r>
+            <a:r>
+              <a:rPr lang="en-US" dirty="0" smtClean="0"/>
+              <a:t>on map</a:t>
+            </a:r>
+          </a:p>
+          <a:p>
+            <a:pPr lvl="1">
+              <a:buFont typeface="Wingdings" pitchFamily="2" charset="2"/>
+              <a:buChar char="ü"/>
+            </a:pPr>
+            <a:r>
+              <a:rPr lang="en-US" dirty="0" smtClean="0"/>
+              <a:t>Drag and Drop Devices on map</a:t>
+            </a:r>
+          </a:p>
+          <a:p>
+            <a:pPr lvl="1">
+              <a:buFont typeface="Wingdings" pitchFamily="2" charset="2"/>
+              <a:buChar char="ü"/>
+            </a:pPr>
+            <a:r>
+              <a:rPr lang="en-US" dirty="0" smtClean="0"/>
+              <a:t>Add new Device</a:t>
+            </a:r>
+          </a:p>
+          <a:p>
+            <a:pPr lvl="1">
+              <a:buFont typeface="Wingdings" pitchFamily="2" charset="2"/>
+              <a:buChar char="ü"/>
+            </a:pPr>
+            <a:r>
+              <a:rPr lang="en-US" dirty="0" smtClean="0"/>
+              <a:t>Show debug information for STA</a:t>
+            </a:r>
+            <a:endParaRPr lang="en-US" dirty="0"/>
+          </a:p>
+          <a:p>
+            <a:pPr lvl="1">
+              <a:buFont typeface="Wingdings" pitchFamily="2" charset="2"/>
+              <a:buChar char="ü"/>
+            </a:pPr>
+            <a:r>
+              <a:rPr lang="en-US" dirty="0" smtClean="0"/>
+              <a:t>Show debug Information for AP</a:t>
+            </a:r>
             <a:endParaRPr lang="en-US" dirty="0"/>
           </a:p>
         </p:txBody>
@@ -7431,6 +7544,54 @@
           </a:p>
         </p:txBody>
       </p:sp>
+      <p:pic>
+        <p:nvPicPr>
+          <p:cNvPr id="4" name="Picture 3"/>
+          <p:cNvPicPr>
+            <a:picLocks noChangeAspect="1"/>
+          </p:cNvPicPr>
+          <p:nvPr/>
+        </p:nvPicPr>
+        <p:blipFill>
+          <a:blip r:embed="rId2">
+            <a:extLst>
+              <a:ext uri="{BEBA8EAE-BF5A-486C-A8C5-ECC9F3942E4B}">
+                <a14:imgProps xmlns:a14="http://schemas.microsoft.com/office/drawing/2010/main">
+                  <a14:imgLayer r:embed="rId3">
+                    <a14:imgEffect>
+                      <a14:sharpenSoften amount="10000"/>
+                    </a14:imgEffect>
+                    <a14:imgEffect>
+                      <a14:colorTemperature colorTemp="7475"/>
+                    </a14:imgEffect>
+                    <a14:imgEffect>
+                      <a14:saturation sat="188000"/>
+                    </a14:imgEffect>
+                  </a14:imgLayer>
+                </a14:imgProps>
+              </a:ext>
+              <a:ext uri="{28A0092B-C50C-407E-A947-70E740481C1C}">
+                <a14:useLocalDpi xmlns:a14="http://schemas.microsoft.com/office/drawing/2010/main" val="0"/>
+              </a:ext>
+            </a:extLst>
+          </a:blip>
+          <a:stretch>
+            <a:fillRect/>
+          </a:stretch>
+        </p:blipFill>
+        <p:spPr>
+          <a:xfrm>
+            <a:off x="5524500" y="3135183"/>
+            <a:ext cx="2346067" cy="2346067"/>
+          </a:xfrm>
+          <a:prstGeom prst="rect">
+            <a:avLst/>
+          </a:prstGeom>
+          <a:effectLst>
+            <a:reflection stA="27000" endPos="65000" dist="50800" dir="5400000" sy="-100000" algn="bl" rotWithShape="0"/>
+          </a:effectLst>
+        </p:spPr>
+      </p:pic>
     </p:spTree>
     <p:extLst>
       <p:ext uri="{BB962C8B-B14F-4D97-AF65-F5344CB8AC3E}">
@@ -7473,18 +7634,203 @@
         </p:nvSpPr>
         <p:spPr>
           <a:xfrm>
-            <a:off x="699247" y="3505200"/>
-            <a:ext cx="7745505" cy="2620962"/>
-          </a:xfrm>
-        </p:spPr>
-        <p:txBody>
-          <a:bodyPr/>
-          <a:lstStyle/>
-          <a:p>
-            <a:pPr marL="0" indent="0" algn="r" rtl="1">
+            <a:off x="699247" y="2819400"/>
+            <a:ext cx="7745505" cy="3306762"/>
+          </a:xfrm>
+        </p:spPr>
+        <p:txBody>
+          <a:bodyPr>
+            <a:normAutofit fontScale="92500" lnSpcReduction="20000"/>
+          </a:bodyPr>
+          <a:lstStyle/>
+          <a:p>
+            <a:pPr marL="0" indent="0" algn="l">
               <a:buNone/>
             </a:pPr>
+            <a:r>
+              <a:rPr lang="en-US" b="1" cap="all" dirty="0" smtClean="0">
+                <a:ln w="9000" cmpd="sng">
+                  <a:solidFill>
+                    <a:schemeClr val="accent4">
+                      <a:shade val="50000"/>
+                      <a:satMod val="120000"/>
+                    </a:schemeClr>
+                  </a:solidFill>
+                  <a:prstDash val="solid"/>
+                </a:ln>
+                <a:gradFill>
+                  <a:gsLst>
+                    <a:gs pos="0">
+                      <a:schemeClr val="accent4">
+                        <a:shade val="20000"/>
+                        <a:satMod val="245000"/>
+                      </a:schemeClr>
+                    </a:gs>
+                    <a:gs pos="43000">
+                      <a:schemeClr val="accent4">
+                        <a:satMod val="255000"/>
+                      </a:schemeClr>
+                    </a:gs>
+                    <a:gs pos="48000">
+                      <a:schemeClr val="accent4">
+                        <a:shade val="85000"/>
+                        <a:satMod val="255000"/>
+                      </a:schemeClr>
+                    </a:gs>
+                    <a:gs pos="100000">
+                      <a:schemeClr val="accent4">
+                        <a:shade val="20000"/>
+                        <a:satMod val="245000"/>
+                      </a:schemeClr>
+                    </a:gs>
+                  </a:gsLst>
+                  <a:lin ang="5400000"/>
+                </a:gradFill>
+                <a:effectLst>
+                  <a:reflection blurRad="12700" stA="28000" endPos="45000" dist="1000" dir="5400000" sy="-100000" algn="bl" rotWithShape="0"/>
+                </a:effectLst>
+              </a:rPr>
+              <a:t>Medium</a:t>
+            </a:r>
+            <a:endParaRPr lang="en-US" dirty="0" smtClean="0"/>
+          </a:p>
+          <a:p>
+            <a:pPr lvl="1">
+              <a:buFont typeface="Wingdings" pitchFamily="2" charset="2"/>
+              <a:buChar char="ü"/>
+            </a:pPr>
+            <a:r>
+              <a:rPr lang="en-US" dirty="0" smtClean="0"/>
+              <a:t>Save simulation</a:t>
+            </a:r>
+          </a:p>
+          <a:p>
+            <a:pPr lvl="1">
+              <a:buFont typeface="Wingdings" pitchFamily="2" charset="2"/>
+              <a:buChar char="ü"/>
+            </a:pPr>
+            <a:r>
+              <a:rPr lang="en-US" dirty="0" smtClean="0"/>
+              <a:t>Load simulation</a:t>
+            </a:r>
+          </a:p>
+          <a:p>
+            <a:pPr lvl="1">
+              <a:buFont typeface="Wingdings" pitchFamily="2" charset="2"/>
+              <a:buChar char="ü"/>
+            </a:pPr>
+            <a:r>
+              <a:rPr lang="en-US" dirty="0" smtClean="0"/>
+              <a:t>Debug mode</a:t>
+            </a:r>
+          </a:p>
+          <a:p>
+            <a:pPr lvl="1">
+              <a:buFont typeface="Wingdings" pitchFamily="2" charset="2"/>
+              <a:buChar char="ü"/>
+            </a:pPr>
+            <a:r>
+              <a:rPr lang="en-US" dirty="0" smtClean="0"/>
+              <a:t>2.4GHz and 5GHz frequency support</a:t>
+            </a:r>
             <a:endParaRPr lang="en-US" dirty="0"/>
+          </a:p>
+          <a:p>
+            <a:pPr marL="0" indent="0">
+              <a:buNone/>
+            </a:pPr>
+            <a:r>
+              <a:rPr lang="en-US" b="1" cap="all" dirty="0">
+                <a:ln w="9000" cmpd="sng">
+                  <a:solidFill>
+                    <a:schemeClr val="accent4">
+                      <a:shade val="50000"/>
+                      <a:satMod val="120000"/>
+                    </a:schemeClr>
+                  </a:solidFill>
+                  <a:prstDash val="solid"/>
+                </a:ln>
+                <a:gradFill>
+                  <a:gsLst>
+                    <a:gs pos="0">
+                      <a:schemeClr val="accent4">
+                        <a:shade val="20000"/>
+                        <a:satMod val="245000"/>
+                      </a:schemeClr>
+                    </a:gs>
+                    <a:gs pos="43000">
+                      <a:schemeClr val="accent4">
+                        <a:satMod val="255000"/>
+                      </a:schemeClr>
+                    </a:gs>
+                    <a:gs pos="48000">
+                      <a:schemeClr val="accent4">
+                        <a:shade val="85000"/>
+                        <a:satMod val="255000"/>
+                      </a:schemeClr>
+                    </a:gs>
+                    <a:gs pos="100000">
+                      <a:schemeClr val="accent4">
+                        <a:shade val="20000"/>
+                        <a:satMod val="245000"/>
+                      </a:schemeClr>
+                    </a:gs>
+                  </a:gsLst>
+                  <a:lin ang="5400000"/>
+                </a:gradFill>
+                <a:effectLst>
+                  <a:reflection blurRad="12700" stA="28000" endPos="45000" dist="1000" dir="5400000" sy="-100000" algn="bl" rotWithShape="0"/>
+                </a:effectLst>
+              </a:rPr>
+              <a:t>AP</a:t>
+            </a:r>
+            <a:endParaRPr lang="en-US" dirty="0"/>
+          </a:p>
+          <a:p>
+            <a:pPr lvl="1">
+              <a:buFont typeface="Wingdings" pitchFamily="2" charset="2"/>
+              <a:buChar char="ü"/>
+            </a:pPr>
+            <a:r>
+              <a:rPr lang="en-US" dirty="0"/>
+              <a:t>Beacon packet</a:t>
+            </a:r>
+          </a:p>
+          <a:p>
+            <a:pPr lvl="1">
+              <a:buFont typeface="Wingdings" pitchFamily="2" charset="2"/>
+              <a:buChar char="ü"/>
+            </a:pPr>
+            <a:r>
+              <a:rPr lang="en-US" dirty="0"/>
+              <a:t>Association packet</a:t>
+            </a:r>
+          </a:p>
+          <a:p>
+            <a:pPr lvl="1">
+              <a:buFont typeface="Wingdings" pitchFamily="2" charset="2"/>
+              <a:buChar char="ü"/>
+            </a:pPr>
+            <a:r>
+              <a:rPr lang="en-US" dirty="0"/>
+              <a:t>Route packets</a:t>
+            </a:r>
+          </a:p>
+          <a:p>
+            <a:pPr lvl="1">
+              <a:buFont typeface="Wingdings" pitchFamily="2" charset="2"/>
+              <a:buChar char="ü"/>
+            </a:pPr>
+            <a:r>
+              <a:rPr lang="en-US" dirty="0"/>
+              <a:t>Disconnect</a:t>
+            </a:r>
+          </a:p>
+          <a:p>
+            <a:pPr marL="0" indent="0">
+              <a:buNone/>
+            </a:pPr>
+            <a:endParaRPr lang="en-US" dirty="0" smtClean="0"/>
           </a:p>
         </p:txBody>
       </p:sp>
@@ -7520,7 +7866,7 @@
         </p:nvSpPr>
         <p:spPr>
           <a:xfrm>
-            <a:off x="6562725" y="2143899"/>
+            <a:off x="371475" y="2144673"/>
             <a:ext cx="2057400" cy="599301"/>
           </a:xfrm>
           <a:prstGeom prst="bevel">
@@ -7665,14 +8011,14 @@
       </p:sp>
       <p:sp>
         <p:nvSpPr>
-          <p:cNvPr id="8" name="TextBox 7"/>
+          <p:cNvPr id="9" name="TextBox 8"/>
           <p:cNvSpPr txBox="1"/>
           <p:nvPr/>
         </p:nvSpPr>
         <p:spPr>
           <a:xfrm>
-            <a:off x="6562725" y="2239833"/>
-            <a:ext cx="1905000" cy="369332"/>
+            <a:off x="4648200" y="2239832"/>
+            <a:ext cx="1828800" cy="369332"/>
           </a:xfrm>
           <a:prstGeom prst="rect">
             <a:avLst/>
@@ -7688,29 +8034,24 @@
             <a:pPr algn="r" rtl="1"/>
             <a:r>
               <a:rPr lang="he-IL" dirty="0" smtClean="0"/>
-              <a:t>דגימת </a:t>
+              <a:t>ניתוח </a:t>
             </a:r>
             <a:r>
               <a:rPr lang="he-IL" dirty="0"/>
-              <a:t>תנאי </a:t>
-            </a:r>
-            <a:r>
-              <a:rPr lang="he-IL" dirty="0" smtClean="0"/>
-              <a:t>סביבה</a:t>
-            </a:r>
-            <a:endParaRPr lang="en-US" dirty="0"/>
-          </a:p>
-        </p:txBody>
-      </p:sp>
-      <p:sp>
-        <p:nvSpPr>
-          <p:cNvPr id="9" name="TextBox 8"/>
+              <a:t>הנתונים</a:t>
+            </a:r>
+          </a:p>
+        </p:txBody>
+      </p:sp>
+      <p:sp>
+        <p:nvSpPr>
+          <p:cNvPr id="10" name="TextBox 9"/>
           <p:cNvSpPr txBox="1"/>
           <p:nvPr/>
         </p:nvSpPr>
         <p:spPr>
           <a:xfrm>
-            <a:off x="4648200" y="2239832"/>
+            <a:off x="2514600" y="2250817"/>
             <a:ext cx="1828800" cy="369332"/>
           </a:xfrm>
           <a:prstGeom prst="rect">
@@ -7726,12 +8067,43 @@
           <a:p>
             <a:pPr algn="r" rtl="1"/>
             <a:r>
+              <a:rPr lang="he-IL" dirty="0"/>
+              <a:t>איתור מקרי </a:t>
+            </a:r>
+            <a:r>
               <a:rPr lang="he-IL" dirty="0" smtClean="0"/>
-              <a:t>ניתוח </a:t>
-            </a:r>
+              <a:t>קצה</a:t>
+            </a:r>
+            <a:endParaRPr lang="he-IL" dirty="0"/>
+          </a:p>
+        </p:txBody>
+      </p:sp>
+      <p:sp>
+        <p:nvSpPr>
+          <p:cNvPr id="12" name="TextBox 11"/>
+          <p:cNvSpPr txBox="1"/>
+          <p:nvPr/>
+        </p:nvSpPr>
+        <p:spPr>
+          <a:xfrm>
+            <a:off x="481012" y="2254507"/>
+            <a:ext cx="1828800" cy="369332"/>
+          </a:xfrm>
+          <a:prstGeom prst="rect">
+            <a:avLst/>
+          </a:prstGeom>
+          <a:noFill/>
+        </p:spPr>
+        <p:txBody>
+          <a:bodyPr wrap="square" rtlCol="0">
+            <a:spAutoFit/>
+          </a:bodyPr>
+          <a:lstStyle/>
+          <a:p>
+            <a:pPr algn="r" rtl="1"/>
             <a:r>
               <a:rPr lang="he-IL" dirty="0"/>
-              <a:t>הנתונים</a:t>
+              <a:t>בניית סימולטור</a:t>
             </a:r>
           </a:p>
         </p:txBody>
@@ -7744,7 +8116,7 @@
         </p:nvSpPr>
         <p:spPr>
           <a:xfrm>
-            <a:off x="361950" y="2143899"/>
+            <a:off x="6553200" y="2143899"/>
             <a:ext cx="2066925" cy="599301"/>
           </a:xfrm>
           <a:prstGeom prst="bevel">
@@ -7792,14 +8164,14 @@
       </p:sp>
       <p:sp>
         <p:nvSpPr>
-          <p:cNvPr id="10" name="TextBox 9"/>
+          <p:cNvPr id="8" name="TextBox 7"/>
           <p:cNvSpPr txBox="1"/>
           <p:nvPr/>
         </p:nvSpPr>
         <p:spPr>
           <a:xfrm>
-            <a:off x="2514600" y="2250817"/>
-            <a:ext cx="1828800" cy="369332"/>
+            <a:off x="6562725" y="2239832"/>
+            <a:ext cx="1905000" cy="369332"/>
           </a:xfrm>
           <a:prstGeom prst="rect">
             <a:avLst/>
@@ -7814,51 +8186,73 @@
           <a:p>
             <a:pPr algn="r" rtl="1"/>
             <a:r>
+              <a:rPr lang="he-IL" dirty="0" smtClean="0"/>
+              <a:t>דגימת </a:t>
+            </a:r>
+            <a:r>
               <a:rPr lang="he-IL" dirty="0"/>
-              <a:t>איתור מקרי </a:t>
+              <a:t>תנאי </a:t>
             </a:r>
             <a:r>
               <a:rPr lang="he-IL" dirty="0" smtClean="0"/>
-              <a:t>קצה</a:t>
-            </a:r>
-            <a:endParaRPr lang="he-IL" dirty="0"/>
-          </a:p>
-        </p:txBody>
-      </p:sp>
-      <p:sp>
-        <p:nvSpPr>
-          <p:cNvPr id="12" name="TextBox 11"/>
-          <p:cNvSpPr txBox="1"/>
+              <a:t>סביבה</a:t>
+            </a:r>
+            <a:endParaRPr lang="en-US" dirty="0"/>
+          </a:p>
+        </p:txBody>
+      </p:sp>
+      <p:pic>
+        <p:nvPicPr>
+          <p:cNvPr id="13" name="Picture 12"/>
+          <p:cNvPicPr>
+            <a:picLocks noChangeAspect="1"/>
+          </p:cNvPicPr>
           <p:nvPr/>
-        </p:nvSpPr>
-        <p:spPr>
-          <a:xfrm>
-            <a:off x="481012" y="2254507"/>
-            <a:ext cx="1828800" cy="369332"/>
+        </p:nvPicPr>
+        <p:blipFill>
+          <a:blip r:embed="rId2">
+            <a:extLst>
+              <a:ext uri="{BEBA8EAE-BF5A-486C-A8C5-ECC9F3942E4B}">
+                <a14:imgProps xmlns:a14="http://schemas.microsoft.com/office/drawing/2010/main">
+                  <a14:imgLayer r:embed="rId3">
+                    <a14:imgEffect>
+                      <a14:sharpenSoften amount="10000"/>
+                    </a14:imgEffect>
+                    <a14:imgEffect>
+                      <a14:colorTemperature colorTemp="7475"/>
+                    </a14:imgEffect>
+                    <a14:imgEffect>
+                      <a14:saturation sat="188000"/>
+                    </a14:imgEffect>
+                  </a14:imgLayer>
+                </a14:imgProps>
+              </a:ext>
+              <a:ext uri="{28A0092B-C50C-407E-A947-70E740481C1C}">
+                <a14:useLocalDpi xmlns:a14="http://schemas.microsoft.com/office/drawing/2010/main" val="0"/>
+              </a:ext>
+            </a:extLst>
+          </a:blip>
+          <a:stretch>
+            <a:fillRect/>
+          </a:stretch>
+        </p:blipFill>
+        <p:spPr>
+          <a:xfrm>
+            <a:off x="5524500" y="3135183"/>
+            <a:ext cx="2346067" cy="2346067"/>
           </a:xfrm>
           <a:prstGeom prst="rect">
             <a:avLst/>
           </a:prstGeom>
-          <a:noFill/>
-        </p:spPr>
-        <p:txBody>
-          <a:bodyPr wrap="square" rtlCol="0">
-            <a:spAutoFit/>
-          </a:bodyPr>
-          <a:lstStyle/>
-          <a:p>
-            <a:pPr algn="r" rtl="1"/>
-            <a:r>
-              <a:rPr lang="he-IL" dirty="0"/>
-              <a:t>בניית סימולטור</a:t>
-            </a:r>
-          </a:p>
-        </p:txBody>
-      </p:sp>
+          <a:effectLst>
+            <a:reflection stA="27000" endPos="65000" dist="50800" dir="5400000" sy="-100000" algn="bl" rotWithShape="0"/>
+          </a:effectLst>
+        </p:spPr>
+      </p:pic>
     </p:spTree>
     <p:extLst>
       <p:ext uri="{BB962C8B-B14F-4D97-AF65-F5344CB8AC3E}">
-        <p14:creationId xmlns:p14="http://schemas.microsoft.com/office/powerpoint/2010/main" val="3256834041"/>
+        <p14:creationId xmlns:p14="http://schemas.microsoft.com/office/powerpoint/2010/main" val="2855946549"/>
       </p:ext>
     </p:extLst>
   </p:cSld>
@@ -7897,17 +8291,123 @@
         </p:nvSpPr>
         <p:spPr>
           <a:xfrm>
-            <a:off x="699247" y="3505200"/>
-            <a:ext cx="7745505" cy="2620962"/>
+            <a:off x="699247" y="2819400"/>
+            <a:ext cx="7745505" cy="3306762"/>
           </a:xfrm>
         </p:spPr>
         <p:txBody>
           <a:bodyPr/>
           <a:lstStyle/>
           <a:p>
-            <a:pPr marL="0" indent="0" algn="r" rtl="1">
+            <a:pPr marL="0" indent="0" algn="l">
               <a:buNone/>
             </a:pPr>
+            <a:r>
+              <a:rPr lang="en-US" b="1" cap="all" dirty="0" smtClean="0">
+                <a:ln w="9000" cmpd="sng">
+                  <a:solidFill>
+                    <a:schemeClr val="accent4">
+                      <a:shade val="50000"/>
+                      <a:satMod val="120000"/>
+                    </a:schemeClr>
+                  </a:solidFill>
+                  <a:prstDash val="solid"/>
+                </a:ln>
+                <a:gradFill>
+                  <a:gsLst>
+                    <a:gs pos="0">
+                      <a:schemeClr val="accent4">
+                        <a:shade val="20000"/>
+                        <a:satMod val="245000"/>
+                      </a:schemeClr>
+                    </a:gs>
+                    <a:gs pos="43000">
+                      <a:schemeClr val="accent4">
+                        <a:satMod val="255000"/>
+                      </a:schemeClr>
+                    </a:gs>
+                    <a:gs pos="48000">
+                      <a:schemeClr val="accent4">
+                        <a:shade val="85000"/>
+                        <a:satMod val="255000"/>
+                      </a:schemeClr>
+                    </a:gs>
+                    <a:gs pos="100000">
+                      <a:schemeClr val="accent4">
+                        <a:shade val="20000"/>
+                        <a:satMod val="245000"/>
+                      </a:schemeClr>
+                    </a:gs>
+                  </a:gsLst>
+                  <a:lin ang="5400000"/>
+                </a:gradFill>
+                <a:effectLst>
+                  <a:reflection blurRad="12700" stA="28000" endPos="45000" dist="1000" dir="5400000" sy="-100000" algn="bl" rotWithShape="0"/>
+                </a:effectLst>
+              </a:rPr>
+              <a:t>STA</a:t>
+            </a:r>
+            <a:endParaRPr lang="en-US" dirty="0" smtClean="0"/>
+          </a:p>
+          <a:p>
+            <a:pPr lvl="1">
+              <a:buFont typeface="Wingdings" pitchFamily="2" charset="2"/>
+              <a:buChar char="ü"/>
+            </a:pPr>
+            <a:r>
+              <a:rPr lang="en-US" dirty="0" smtClean="0"/>
+              <a:t>Beacon packet</a:t>
+            </a:r>
+          </a:p>
+          <a:p>
+            <a:pPr lvl="1">
+              <a:buFont typeface="Wingdings" pitchFamily="2" charset="2"/>
+              <a:buChar char="ü"/>
+            </a:pPr>
+            <a:r>
+              <a:rPr lang="en-US" dirty="0" smtClean="0"/>
+              <a:t>Association packet</a:t>
+            </a:r>
+          </a:p>
+          <a:p>
+            <a:pPr lvl="1">
+              <a:buFont typeface="Wingdings" pitchFamily="2" charset="2"/>
+              <a:buChar char="ü"/>
+            </a:pPr>
+            <a:r>
+              <a:rPr lang="en-US" dirty="0" smtClean="0"/>
+              <a:t>Scan</a:t>
+            </a:r>
+          </a:p>
+          <a:p>
+            <a:pPr lvl="1">
+              <a:buFont typeface="Wingdings" pitchFamily="2" charset="2"/>
+              <a:buChar char="ü"/>
+            </a:pPr>
+            <a:r>
+              <a:rPr lang="en-US" dirty="0" smtClean="0"/>
+              <a:t>Send/Receive </a:t>
+            </a:r>
+          </a:p>
+          <a:p>
+            <a:pPr lvl="1">
+              <a:buFont typeface="Wingdings" pitchFamily="2" charset="2"/>
+              <a:buChar char="ü"/>
+            </a:pPr>
+            <a:r>
+              <a:rPr lang="en-US" dirty="0" smtClean="0"/>
+              <a:t>Disconnect</a:t>
+            </a:r>
+          </a:p>
+          <a:p>
+            <a:pPr lvl="1">
+              <a:buFont typeface="Wingdings" pitchFamily="2" charset="2"/>
+              <a:buChar char="ü"/>
+            </a:pPr>
+            <a:r>
+              <a:rPr lang="en-US" dirty="0" smtClean="0"/>
+              <a:t>Reconnect</a:t>
+            </a:r>
             <a:endParaRPr lang="en-US" dirty="0"/>
           </a:p>
         </p:txBody>
@@ -7944,7 +8444,7 @@
         </p:nvSpPr>
         <p:spPr>
           <a:xfrm>
-            <a:off x="6562725" y="2143899"/>
+            <a:off x="371475" y="2144673"/>
             <a:ext cx="2057400" cy="599301"/>
           </a:xfrm>
           <a:prstGeom prst="bevel">
@@ -8089,14 +8589,14 @@
       </p:sp>
       <p:sp>
         <p:nvSpPr>
-          <p:cNvPr id="8" name="TextBox 7"/>
+          <p:cNvPr id="9" name="TextBox 8"/>
           <p:cNvSpPr txBox="1"/>
           <p:nvPr/>
         </p:nvSpPr>
         <p:spPr>
           <a:xfrm>
-            <a:off x="6562725" y="2239833"/>
-            <a:ext cx="1905000" cy="369332"/>
+            <a:off x="4648200" y="2239832"/>
+            <a:ext cx="1828800" cy="369332"/>
           </a:xfrm>
           <a:prstGeom prst="rect">
             <a:avLst/>
@@ -8112,29 +8612,24 @@
             <a:pPr algn="r" rtl="1"/>
             <a:r>
               <a:rPr lang="he-IL" dirty="0" smtClean="0"/>
-              <a:t>דגימת </a:t>
+              <a:t>ניתוח </a:t>
             </a:r>
             <a:r>
               <a:rPr lang="he-IL" dirty="0"/>
-              <a:t>תנאי </a:t>
-            </a:r>
-            <a:r>
-              <a:rPr lang="he-IL" dirty="0" smtClean="0"/>
-              <a:t>סביבה</a:t>
-            </a:r>
-            <a:endParaRPr lang="en-US" dirty="0"/>
-          </a:p>
-        </p:txBody>
-      </p:sp>
-      <p:sp>
-        <p:nvSpPr>
-          <p:cNvPr id="9" name="TextBox 8"/>
+              <a:t>הנתונים</a:t>
+            </a:r>
+          </a:p>
+        </p:txBody>
+      </p:sp>
+      <p:sp>
+        <p:nvSpPr>
+          <p:cNvPr id="10" name="TextBox 9"/>
           <p:cNvSpPr txBox="1"/>
           <p:nvPr/>
         </p:nvSpPr>
         <p:spPr>
           <a:xfrm>
-            <a:off x="4648200" y="2239832"/>
+            <a:off x="2514600" y="2250817"/>
             <a:ext cx="1828800" cy="369332"/>
           </a:xfrm>
           <a:prstGeom prst="rect">
@@ -8150,12 +8645,43 @@
           <a:p>
             <a:pPr algn="r" rtl="1"/>
             <a:r>
+              <a:rPr lang="he-IL" dirty="0"/>
+              <a:t>איתור מקרי </a:t>
+            </a:r>
+            <a:r>
               <a:rPr lang="he-IL" dirty="0" smtClean="0"/>
-              <a:t>ניתוח </a:t>
-            </a:r>
+              <a:t>קצה</a:t>
+            </a:r>
+            <a:endParaRPr lang="he-IL" dirty="0"/>
+          </a:p>
+        </p:txBody>
+      </p:sp>
+      <p:sp>
+        <p:nvSpPr>
+          <p:cNvPr id="12" name="TextBox 11"/>
+          <p:cNvSpPr txBox="1"/>
+          <p:nvPr/>
+        </p:nvSpPr>
+        <p:spPr>
+          <a:xfrm>
+            <a:off x="481012" y="2254507"/>
+            <a:ext cx="1828800" cy="369332"/>
+          </a:xfrm>
+          <a:prstGeom prst="rect">
+            <a:avLst/>
+          </a:prstGeom>
+          <a:noFill/>
+        </p:spPr>
+        <p:txBody>
+          <a:bodyPr wrap="square" rtlCol="0">
+            <a:spAutoFit/>
+          </a:bodyPr>
+          <a:lstStyle/>
+          <a:p>
+            <a:pPr algn="r" rtl="1"/>
             <a:r>
               <a:rPr lang="he-IL" dirty="0"/>
-              <a:t>הנתונים</a:t>
+              <a:t>בניית סימולטור</a:t>
             </a:r>
           </a:p>
         </p:txBody>
@@ -8168,7 +8694,7 @@
         </p:nvSpPr>
         <p:spPr>
           <a:xfrm>
-            <a:off x="361950" y="2143899"/>
+            <a:off x="6553200" y="2143899"/>
             <a:ext cx="2066925" cy="599301"/>
           </a:xfrm>
           <a:prstGeom prst="bevel">
@@ -8216,14 +8742,14 @@
       </p:sp>
       <p:sp>
         <p:nvSpPr>
-          <p:cNvPr id="10" name="TextBox 9"/>
+          <p:cNvPr id="8" name="TextBox 7"/>
           <p:cNvSpPr txBox="1"/>
           <p:nvPr/>
         </p:nvSpPr>
         <p:spPr>
           <a:xfrm>
-            <a:off x="2514600" y="2250817"/>
-            <a:ext cx="1828800" cy="369332"/>
+            <a:off x="6562725" y="2239832"/>
+            <a:ext cx="1905000" cy="369332"/>
           </a:xfrm>
           <a:prstGeom prst="rect">
             <a:avLst/>
@@ -8238,51 +8764,73 @@
           <a:p>
             <a:pPr algn="r" rtl="1"/>
             <a:r>
+              <a:rPr lang="he-IL" dirty="0" smtClean="0"/>
+              <a:t>דגימת </a:t>
+            </a:r>
+            <a:r>
               <a:rPr lang="he-IL" dirty="0"/>
-              <a:t>איתור מקרי </a:t>
+              <a:t>תנאי </a:t>
             </a:r>
             <a:r>
               <a:rPr lang="he-IL" dirty="0" smtClean="0"/>
-              <a:t>קצה</a:t>
-            </a:r>
-            <a:endParaRPr lang="he-IL" dirty="0"/>
-          </a:p>
-        </p:txBody>
-      </p:sp>
-      <p:sp>
-        <p:nvSpPr>
-          <p:cNvPr id="12" name="TextBox 11"/>
-          <p:cNvSpPr txBox="1"/>
+              <a:t>סביבה</a:t>
+            </a:r>
+            <a:endParaRPr lang="en-US" dirty="0"/>
+          </a:p>
+        </p:txBody>
+      </p:sp>
+      <p:pic>
+        <p:nvPicPr>
+          <p:cNvPr id="13" name="Picture 12"/>
+          <p:cNvPicPr>
+            <a:picLocks noChangeAspect="1"/>
+          </p:cNvPicPr>
           <p:nvPr/>
-        </p:nvSpPr>
-        <p:spPr>
-          <a:xfrm>
-            <a:off x="481012" y="2254507"/>
-            <a:ext cx="1828800" cy="369332"/>
+        </p:nvPicPr>
+        <p:blipFill>
+          <a:blip r:embed="rId2">
+            <a:extLst>
+              <a:ext uri="{BEBA8EAE-BF5A-486C-A8C5-ECC9F3942E4B}">
+                <a14:imgProps xmlns:a14="http://schemas.microsoft.com/office/drawing/2010/main">
+                  <a14:imgLayer r:embed="rId3">
+                    <a14:imgEffect>
+                      <a14:sharpenSoften amount="10000"/>
+                    </a14:imgEffect>
+                    <a14:imgEffect>
+                      <a14:colorTemperature colorTemp="7475"/>
+                    </a14:imgEffect>
+                    <a14:imgEffect>
+                      <a14:saturation sat="188000"/>
+                    </a14:imgEffect>
+                  </a14:imgLayer>
+                </a14:imgProps>
+              </a:ext>
+              <a:ext uri="{28A0092B-C50C-407E-A947-70E740481C1C}">
+                <a14:useLocalDpi xmlns:a14="http://schemas.microsoft.com/office/drawing/2010/main" val="0"/>
+              </a:ext>
+            </a:extLst>
+          </a:blip>
+          <a:stretch>
+            <a:fillRect/>
+          </a:stretch>
+        </p:blipFill>
+        <p:spPr>
+          <a:xfrm>
+            <a:off x="5524500" y="3135183"/>
+            <a:ext cx="2346067" cy="2346067"/>
           </a:xfrm>
           <a:prstGeom prst="rect">
             <a:avLst/>
           </a:prstGeom>
-          <a:noFill/>
-        </p:spPr>
-        <p:txBody>
-          <a:bodyPr wrap="square" rtlCol="0">
-            <a:spAutoFit/>
-          </a:bodyPr>
-          <a:lstStyle/>
-          <a:p>
-            <a:pPr algn="r" rtl="1"/>
-            <a:r>
-              <a:rPr lang="he-IL" dirty="0"/>
-              <a:t>בניית סימולטור</a:t>
-            </a:r>
-          </a:p>
-        </p:txBody>
-      </p:sp>
+          <a:effectLst>
+            <a:reflection stA="27000" endPos="65000" dist="50800" dir="5400000" sy="-100000" algn="bl" rotWithShape="0"/>
+          </a:effectLst>
+        </p:spPr>
+      </p:pic>
     </p:spTree>
     <p:extLst>
       <p:ext uri="{BB962C8B-B14F-4D97-AF65-F5344CB8AC3E}">
-        <p14:creationId xmlns:p14="http://schemas.microsoft.com/office/powerpoint/2010/main" val="3256834041"/>
+        <p14:creationId xmlns:p14="http://schemas.microsoft.com/office/powerpoint/2010/main" val="2638575526"/>
       </p:ext>
     </p:extLst>
   </p:cSld>
@@ -8321,15 +8869,15 @@
         </p:nvSpPr>
         <p:spPr>
           <a:xfrm>
-            <a:off x="699247" y="3505200"/>
-            <a:ext cx="7745505" cy="2620962"/>
+            <a:off x="699247" y="2819400"/>
+            <a:ext cx="7745505" cy="3306762"/>
           </a:xfrm>
         </p:spPr>
         <p:txBody>
           <a:bodyPr/>
           <a:lstStyle/>
           <a:p>
-            <a:pPr marL="0" indent="0" algn="r" rtl="1">
+            <a:pPr marL="0" indent="0" algn="l">
               <a:buNone/>
             </a:pPr>
             <a:endParaRPr lang="en-US" dirty="0"/>
@@ -8368,7 +8916,7 @@
         </p:nvSpPr>
         <p:spPr>
           <a:xfrm>
-            <a:off x="6562725" y="2143899"/>
+            <a:off x="371475" y="2144673"/>
             <a:ext cx="2057400" cy="599301"/>
           </a:xfrm>
           <a:prstGeom prst="bevel">
@@ -8513,14 +9061,14 @@
       </p:sp>
       <p:sp>
         <p:nvSpPr>
-          <p:cNvPr id="8" name="TextBox 7"/>
+          <p:cNvPr id="9" name="TextBox 8"/>
           <p:cNvSpPr txBox="1"/>
           <p:nvPr/>
         </p:nvSpPr>
         <p:spPr>
           <a:xfrm>
-            <a:off x="6562725" y="2239833"/>
-            <a:ext cx="1905000" cy="369332"/>
+            <a:off x="4648200" y="2239832"/>
+            <a:ext cx="1828800" cy="369332"/>
           </a:xfrm>
           <a:prstGeom prst="rect">
             <a:avLst/>
@@ -8536,29 +9084,24 @@
             <a:pPr algn="r" rtl="1"/>
             <a:r>
               <a:rPr lang="he-IL" dirty="0" smtClean="0"/>
-              <a:t>דגימת </a:t>
+              <a:t>ניתוח </a:t>
             </a:r>
             <a:r>
               <a:rPr lang="he-IL" dirty="0"/>
-              <a:t>תנאי </a:t>
-            </a:r>
-            <a:r>
-              <a:rPr lang="he-IL" dirty="0" smtClean="0"/>
-              <a:t>סביבה</a:t>
-            </a:r>
-            <a:endParaRPr lang="en-US" dirty="0"/>
-          </a:p>
-        </p:txBody>
-      </p:sp>
-      <p:sp>
-        <p:nvSpPr>
-          <p:cNvPr id="9" name="TextBox 8"/>
+              <a:t>הנתונים</a:t>
+            </a:r>
+          </a:p>
+        </p:txBody>
+      </p:sp>
+      <p:sp>
+        <p:nvSpPr>
+          <p:cNvPr id="10" name="TextBox 9"/>
           <p:cNvSpPr txBox="1"/>
           <p:nvPr/>
         </p:nvSpPr>
         <p:spPr>
           <a:xfrm>
-            <a:off x="4648200" y="2239832"/>
+            <a:off x="2514600" y="2250817"/>
             <a:ext cx="1828800" cy="369332"/>
           </a:xfrm>
           <a:prstGeom prst="rect">
@@ -8574,12 +9117,43 @@
           <a:p>
             <a:pPr algn="r" rtl="1"/>
             <a:r>
+              <a:rPr lang="he-IL" dirty="0"/>
+              <a:t>איתור מקרי </a:t>
+            </a:r>
+            <a:r>
               <a:rPr lang="he-IL" dirty="0" smtClean="0"/>
-              <a:t>ניתוח </a:t>
-            </a:r>
+              <a:t>קצה</a:t>
+            </a:r>
+            <a:endParaRPr lang="he-IL" dirty="0"/>
+          </a:p>
+        </p:txBody>
+      </p:sp>
+      <p:sp>
+        <p:nvSpPr>
+          <p:cNvPr id="12" name="TextBox 11"/>
+          <p:cNvSpPr txBox="1"/>
+          <p:nvPr/>
+        </p:nvSpPr>
+        <p:spPr>
+          <a:xfrm>
+            <a:off x="481012" y="2254507"/>
+            <a:ext cx="1828800" cy="369332"/>
+          </a:xfrm>
+          <a:prstGeom prst="rect">
+            <a:avLst/>
+          </a:prstGeom>
+          <a:noFill/>
+        </p:spPr>
+        <p:txBody>
+          <a:bodyPr wrap="square" rtlCol="0">
+            <a:spAutoFit/>
+          </a:bodyPr>
+          <a:lstStyle/>
+          <a:p>
+            <a:pPr algn="r" rtl="1"/>
             <a:r>
               <a:rPr lang="he-IL" dirty="0"/>
-              <a:t>הנתונים</a:t>
+              <a:t>בניית סימולטור</a:t>
             </a:r>
           </a:p>
         </p:txBody>
@@ -8592,7 +9166,7 @@
         </p:nvSpPr>
         <p:spPr>
           <a:xfrm>
-            <a:off x="361950" y="2143899"/>
+            <a:off x="6553200" y="2143899"/>
             <a:ext cx="2066925" cy="599301"/>
           </a:xfrm>
           <a:prstGeom prst="bevel">
@@ -8640,14 +9214,14 @@
       </p:sp>
       <p:sp>
         <p:nvSpPr>
-          <p:cNvPr id="10" name="TextBox 9"/>
+          <p:cNvPr id="8" name="TextBox 7"/>
           <p:cNvSpPr txBox="1"/>
           <p:nvPr/>
         </p:nvSpPr>
         <p:spPr>
           <a:xfrm>
-            <a:off x="2514600" y="2250817"/>
-            <a:ext cx="1828800" cy="369332"/>
+            <a:off x="6562725" y="2239832"/>
+            <a:ext cx="1905000" cy="369332"/>
           </a:xfrm>
           <a:prstGeom prst="rect">
             <a:avLst/>
@@ -8662,51 +9236,25 @@
           <a:p>
             <a:pPr algn="r" rtl="1"/>
             <a:r>
+              <a:rPr lang="he-IL" dirty="0" smtClean="0"/>
+              <a:t>דגימת </a:t>
+            </a:r>
+            <a:r>
               <a:rPr lang="he-IL" dirty="0"/>
-              <a:t>איתור מקרי </a:t>
+              <a:t>תנאי </a:t>
             </a:r>
             <a:r>
               <a:rPr lang="he-IL" dirty="0" smtClean="0"/>
-              <a:t>קצה</a:t>
-            </a:r>
-            <a:endParaRPr lang="he-IL" dirty="0"/>
-          </a:p>
-        </p:txBody>
-      </p:sp>
-      <p:sp>
-        <p:nvSpPr>
-          <p:cNvPr id="12" name="TextBox 11"/>
-          <p:cNvSpPr txBox="1"/>
-          <p:nvPr/>
-        </p:nvSpPr>
-        <p:spPr>
-          <a:xfrm>
-            <a:off x="481012" y="2254507"/>
-            <a:ext cx="1828800" cy="369332"/>
-          </a:xfrm>
-          <a:prstGeom prst="rect">
-            <a:avLst/>
-          </a:prstGeom>
-          <a:noFill/>
-        </p:spPr>
-        <p:txBody>
-          <a:bodyPr wrap="square" rtlCol="0">
-            <a:spAutoFit/>
-          </a:bodyPr>
-          <a:lstStyle/>
-          <a:p>
-            <a:pPr algn="r" rtl="1"/>
-            <a:r>
-              <a:rPr lang="he-IL" dirty="0"/>
-              <a:t>בניית סימולטור</a:t>
-            </a:r>
+              <a:t>סביבה</a:t>
+            </a:r>
+            <a:endParaRPr lang="en-US" dirty="0"/>
           </a:p>
         </p:txBody>
       </p:sp>
     </p:spTree>
     <p:extLst>
       <p:ext uri="{BB962C8B-B14F-4D97-AF65-F5344CB8AC3E}">
-        <p14:creationId xmlns:p14="http://schemas.microsoft.com/office/powerpoint/2010/main" val="3256834041"/>
+        <p14:creationId xmlns:p14="http://schemas.microsoft.com/office/powerpoint/2010/main" val="72064689"/>
       </p:ext>
     </p:extLst>
   </p:cSld>
@@ -10017,151 +10565,18 @@
         </p:nvSpPr>
         <p:spPr>
           <a:xfrm>
-            <a:off x="0" y="1981200"/>
-            <a:ext cx="9143999" cy="4876799"/>
-          </a:xfrm>
-        </p:spPr>
-        <p:txBody>
-          <a:bodyPr>
-            <a:normAutofit/>
-          </a:bodyPr>
-          <a:lstStyle/>
-          <a:p>
-            <a:pPr algn="r" rtl="1"/>
-            <a:r>
-              <a:rPr lang="he-IL" dirty="0" smtClean="0"/>
-              <a:t>למידת פרוטוקולי </a:t>
-            </a:r>
-            <a:r>
-              <a:rPr lang="en-US" dirty="0" smtClean="0"/>
-              <a:t>WIFI</a:t>
-            </a:r>
-            <a:endParaRPr lang="he-IL" dirty="0" smtClean="0"/>
-          </a:p>
-          <a:p>
-            <a:pPr lvl="1" algn="r" rtl="1"/>
-            <a:r>
-              <a:rPr lang="en-US" dirty="0" smtClean="0"/>
-              <a:t>DRS</a:t>
-            </a:r>
-            <a:r>
-              <a:rPr lang="he-IL" dirty="0" smtClean="0"/>
-              <a:t>,</a:t>
-            </a:r>
-            <a:r>
-              <a:rPr lang="en-US" dirty="0" smtClean="0"/>
-              <a:t>TDLS</a:t>
-            </a:r>
-            <a:r>
-              <a:rPr lang="he-IL" dirty="0" smtClean="0"/>
-              <a:t>,</a:t>
-            </a:r>
-            <a:r>
-              <a:rPr lang="en-US" dirty="0" smtClean="0"/>
-              <a:t>BSS</a:t>
-            </a:r>
-            <a:endParaRPr lang="he-IL" dirty="0" smtClean="0"/>
-          </a:p>
-          <a:p>
-            <a:pPr algn="r" rtl="1"/>
-            <a:r>
-              <a:rPr lang="he-IL" dirty="0" smtClean="0"/>
-              <a:t>הכרת אופן ביצוע מחקר בעולם התקשורת של מחקרים קיימים</a:t>
-            </a:r>
-          </a:p>
-          <a:p>
-            <a:pPr algn="r" rtl="1"/>
-            <a:r>
-              <a:rPr lang="he-IL" dirty="0" smtClean="0"/>
-              <a:t>בניית סימולטור </a:t>
-            </a:r>
-          </a:p>
-          <a:p>
-            <a:pPr lvl="1" algn="r" rtl="1"/>
-            <a:r>
-              <a:rPr lang="he-IL" dirty="0" smtClean="0"/>
-              <a:t>מנגנון </a:t>
-            </a:r>
-            <a:r>
-              <a:rPr lang="en-US" dirty="0" smtClean="0"/>
-              <a:t>PRESENTOR</a:t>
-            </a:r>
-            <a:endParaRPr lang="he-IL" dirty="0" smtClean="0"/>
-          </a:p>
-          <a:p>
-            <a:pPr lvl="1" algn="r" rtl="1"/>
-            <a:r>
-              <a:rPr lang="he-IL" dirty="0" smtClean="0"/>
-              <a:t>יצירת מודולים ראשיים בצורה גנרית ככל הניתן: </a:t>
-            </a:r>
-            <a:r>
-              <a:rPr lang="en-US" dirty="0" smtClean="0"/>
-              <a:t>AP</a:t>
-            </a:r>
-            <a:r>
-              <a:rPr lang="he-IL" dirty="0" smtClean="0"/>
-              <a:t>,</a:t>
-            </a:r>
-            <a:r>
-              <a:rPr lang="en-US" dirty="0" smtClean="0"/>
-              <a:t>MEADIUM</a:t>
-            </a:r>
-            <a:r>
-              <a:rPr lang="he-IL" dirty="0" smtClean="0"/>
-              <a:t>,</a:t>
-            </a:r>
-            <a:r>
-              <a:rPr lang="en-US" dirty="0" smtClean="0"/>
-              <a:t>STATION</a:t>
-            </a:r>
-            <a:endParaRPr lang="he-IL" dirty="0" smtClean="0"/>
-          </a:p>
-          <a:p>
-            <a:pPr lvl="1" algn="r" rtl="1"/>
-            <a:r>
-              <a:rPr lang="he-IL" dirty="0" smtClean="0"/>
-              <a:t>מנגנון להעברת מיידע , בניית </a:t>
-            </a:r>
-            <a:r>
-              <a:rPr lang="he-IL" dirty="0" err="1" smtClean="0"/>
-              <a:t>פק</a:t>
-            </a:r>
-            <a:r>
-              <a:rPr lang="he-IL" dirty="0" err="1"/>
-              <a:t>ט</a:t>
-            </a:r>
-            <a:r>
-              <a:rPr lang="he-IL" dirty="0" err="1" smtClean="0"/>
-              <a:t>ות</a:t>
-            </a:r>
-            <a:r>
-              <a:rPr lang="he-IL" dirty="0" smtClean="0"/>
-              <a:t> ומימוש חלקי של פרוטוקולים בסיסיים:</a:t>
-            </a:r>
-            <a:r>
-              <a:rPr lang="en-US" dirty="0" smtClean="0"/>
-              <a:t>connect/disconnect</a:t>
-            </a:r>
-            <a:r>
-              <a:rPr lang="he-IL" dirty="0" smtClean="0"/>
-              <a:t> </a:t>
-            </a:r>
-            <a:r>
-              <a:rPr lang="en-US" dirty="0" smtClean="0"/>
-              <a:t> scanning, beacon, keep-alive , rate scaling</a:t>
-            </a:r>
-            <a:endParaRPr lang="he-IL" dirty="0" smtClean="0"/>
-          </a:p>
-          <a:p>
-            <a:pPr lvl="1" algn="r" rtl="1"/>
-            <a:r>
-              <a:rPr lang="he-IL" dirty="0" smtClean="0"/>
-              <a:t>שמירה ופתיחה של סימולציה קיימת ל/מקובץ.</a:t>
-            </a:r>
-          </a:p>
-          <a:p>
-            <a:pPr algn="r" rtl="1"/>
-            <a:endParaRPr lang="he-IL" dirty="0"/>
+            <a:off x="699247" y="3505200"/>
+            <a:ext cx="7745505" cy="2620962"/>
+          </a:xfrm>
+        </p:spPr>
+        <p:txBody>
+          <a:bodyPr/>
+          <a:lstStyle/>
+          <a:p>
+            <a:pPr marL="0" indent="0" algn="r" rtl="1">
+              <a:buNone/>
+            </a:pPr>
+            <a:endParaRPr lang="en-US" dirty="0"/>
           </a:p>
         </p:txBody>
       </p:sp>
@@ -10180,31 +10595,368 @@
           <a:bodyPr/>
           <a:lstStyle/>
           <a:p>
+            <a:pPr rtl="1"/>
             <a:r>
               <a:rPr lang="he-IL" dirty="0" smtClean="0"/>
-              <a:t>מה עשנו עד עכשיו</a:t>
+              <a:t>דרישות המרכיבים</a:t>
             </a:r>
             <a:endParaRPr lang="en-US" dirty="0"/>
+          </a:p>
+        </p:txBody>
+      </p:sp>
+      <p:sp>
+        <p:nvSpPr>
+          <p:cNvPr id="5" name="Bevel 4"/>
+          <p:cNvSpPr/>
+          <p:nvPr/>
+        </p:nvSpPr>
+        <p:spPr>
+          <a:xfrm>
+            <a:off x="6562725" y="2143899"/>
+            <a:ext cx="2057400" cy="599301"/>
+          </a:xfrm>
+          <a:prstGeom prst="bevel">
+            <a:avLst/>
+          </a:prstGeom>
+          <a:solidFill>
+            <a:srgbClr val="FFC000"/>
+          </a:solidFill>
+        </p:spPr>
+        <p:style>
+          <a:lnRef idx="2">
+            <a:schemeClr val="accent1">
+              <a:shade val="50000"/>
+            </a:schemeClr>
+          </a:lnRef>
+          <a:fillRef idx="1">
+            <a:schemeClr val="accent1"/>
+          </a:fillRef>
+          <a:effectRef idx="0">
+            <a:schemeClr val="accent1"/>
+          </a:effectRef>
+          <a:fontRef idx="minor">
+            <a:schemeClr val="lt1"/>
+          </a:fontRef>
+        </p:style>
+        <p:txBody>
+          <a:bodyPr rtlCol="0" anchor="ctr"/>
+          <a:lstStyle/>
+          <a:p>
+            <a:pPr algn="ctr"/>
+            <a:endParaRPr lang="en-US"/>
+          </a:p>
+        </p:txBody>
+      </p:sp>
+      <p:sp>
+        <p:nvSpPr>
+          <p:cNvPr id="6" name="Bevel 5"/>
+          <p:cNvSpPr/>
+          <p:nvPr/>
+        </p:nvSpPr>
+        <p:spPr>
+          <a:xfrm>
+            <a:off x="4495800" y="2143899"/>
+            <a:ext cx="2057400" cy="599301"/>
+          </a:xfrm>
+          <a:prstGeom prst="bevel">
+            <a:avLst/>
+          </a:prstGeom>
+          <a:gradFill>
+            <a:gsLst>
+              <a:gs pos="0">
+                <a:srgbClr val="FFEFD1"/>
+              </a:gs>
+              <a:gs pos="64999">
+                <a:srgbClr val="F0EBD5"/>
+              </a:gs>
+              <a:gs pos="100000">
+                <a:srgbClr val="D1C39F"/>
+              </a:gs>
+            </a:gsLst>
+            <a:lin ang="0" scaled="0"/>
+          </a:gradFill>
+        </p:spPr>
+        <p:style>
+          <a:lnRef idx="2">
+            <a:schemeClr val="accent1">
+              <a:shade val="50000"/>
+            </a:schemeClr>
+          </a:lnRef>
+          <a:fillRef idx="1">
+            <a:schemeClr val="accent1"/>
+          </a:fillRef>
+          <a:effectRef idx="0">
+            <a:schemeClr val="accent1"/>
+          </a:effectRef>
+          <a:fontRef idx="minor">
+            <a:schemeClr val="lt1"/>
+          </a:fontRef>
+        </p:style>
+        <p:txBody>
+          <a:bodyPr rtlCol="0" anchor="ctr"/>
+          <a:lstStyle/>
+          <a:p>
+            <a:pPr algn="ctr"/>
+            <a:endParaRPr lang="en-US"/>
+          </a:p>
+        </p:txBody>
+      </p:sp>
+      <p:sp>
+        <p:nvSpPr>
+          <p:cNvPr id="7" name="Bevel 6"/>
+          <p:cNvSpPr/>
+          <p:nvPr/>
+        </p:nvSpPr>
+        <p:spPr>
+          <a:xfrm>
+            <a:off x="2428875" y="2143899"/>
+            <a:ext cx="2066925" cy="599301"/>
+          </a:xfrm>
+          <a:prstGeom prst="bevel">
+            <a:avLst/>
+          </a:prstGeom>
+          <a:gradFill>
+            <a:gsLst>
+              <a:gs pos="0">
+                <a:srgbClr val="FFEFD1"/>
+              </a:gs>
+              <a:gs pos="64999">
+                <a:srgbClr val="F0EBD5"/>
+              </a:gs>
+              <a:gs pos="100000">
+                <a:srgbClr val="D1C39F"/>
+              </a:gs>
+            </a:gsLst>
+            <a:lin ang="0" scaled="0"/>
+          </a:gradFill>
+        </p:spPr>
+        <p:style>
+          <a:lnRef idx="2">
+            <a:schemeClr val="accent1">
+              <a:shade val="50000"/>
+            </a:schemeClr>
+          </a:lnRef>
+          <a:fillRef idx="1">
+            <a:schemeClr val="accent1"/>
+          </a:fillRef>
+          <a:effectRef idx="0">
+            <a:schemeClr val="accent1"/>
+          </a:effectRef>
+          <a:fontRef idx="minor">
+            <a:schemeClr val="lt1"/>
+          </a:fontRef>
+        </p:style>
+        <p:txBody>
+          <a:bodyPr rtlCol="0" anchor="ctr"/>
+          <a:lstStyle/>
+          <a:p>
+            <a:pPr algn="ctr"/>
+            <a:endParaRPr lang="en-US"/>
+          </a:p>
+        </p:txBody>
+      </p:sp>
+      <p:sp>
+        <p:nvSpPr>
+          <p:cNvPr id="8" name="TextBox 7"/>
+          <p:cNvSpPr txBox="1"/>
+          <p:nvPr/>
+        </p:nvSpPr>
+        <p:spPr>
+          <a:xfrm>
+            <a:off x="6562725" y="2239833"/>
+            <a:ext cx="1905000" cy="369332"/>
+          </a:xfrm>
+          <a:prstGeom prst="rect">
+            <a:avLst/>
+          </a:prstGeom>
+          <a:noFill/>
+        </p:spPr>
+        <p:txBody>
+          <a:bodyPr wrap="square" rtlCol="0">
+            <a:spAutoFit/>
+          </a:bodyPr>
+          <a:lstStyle/>
+          <a:p>
+            <a:pPr algn="r" rtl="1"/>
+            <a:r>
+              <a:rPr lang="he-IL" dirty="0" smtClean="0"/>
+              <a:t>דגימת </a:t>
+            </a:r>
+            <a:r>
+              <a:rPr lang="he-IL" dirty="0"/>
+              <a:t>תנאי </a:t>
+            </a:r>
+            <a:r>
+              <a:rPr lang="he-IL" dirty="0" smtClean="0"/>
+              <a:t>סביבה</a:t>
+            </a:r>
+            <a:endParaRPr lang="en-US" dirty="0"/>
+          </a:p>
+        </p:txBody>
+      </p:sp>
+      <p:sp>
+        <p:nvSpPr>
+          <p:cNvPr id="9" name="TextBox 8"/>
+          <p:cNvSpPr txBox="1"/>
+          <p:nvPr/>
+        </p:nvSpPr>
+        <p:spPr>
+          <a:xfrm>
+            <a:off x="4648200" y="2239832"/>
+            <a:ext cx="1828800" cy="369332"/>
+          </a:xfrm>
+          <a:prstGeom prst="rect">
+            <a:avLst/>
+          </a:prstGeom>
+          <a:noFill/>
+        </p:spPr>
+        <p:txBody>
+          <a:bodyPr wrap="square" rtlCol="0">
+            <a:spAutoFit/>
+          </a:bodyPr>
+          <a:lstStyle/>
+          <a:p>
+            <a:pPr algn="r" rtl="1"/>
+            <a:r>
+              <a:rPr lang="he-IL" dirty="0" smtClean="0"/>
+              <a:t>ניתוח </a:t>
+            </a:r>
+            <a:r>
+              <a:rPr lang="he-IL" dirty="0"/>
+              <a:t>הנתונים</a:t>
+            </a:r>
+          </a:p>
+        </p:txBody>
+      </p:sp>
+      <p:sp>
+        <p:nvSpPr>
+          <p:cNvPr id="11" name="Bevel 10"/>
+          <p:cNvSpPr/>
+          <p:nvPr/>
+        </p:nvSpPr>
+        <p:spPr>
+          <a:xfrm>
+            <a:off x="361950" y="2143899"/>
+            <a:ext cx="2066925" cy="599301"/>
+          </a:xfrm>
+          <a:prstGeom prst="bevel">
+            <a:avLst/>
+          </a:prstGeom>
+          <a:gradFill>
+            <a:gsLst>
+              <a:gs pos="0">
+                <a:srgbClr val="FFEFD1"/>
+              </a:gs>
+              <a:gs pos="64999">
+                <a:srgbClr val="F0EBD5"/>
+              </a:gs>
+              <a:gs pos="100000">
+                <a:srgbClr val="D1C39F"/>
+              </a:gs>
+            </a:gsLst>
+            <a:lin ang="0" scaled="0"/>
+          </a:gradFill>
+        </p:spPr>
+        <p:style>
+          <a:lnRef idx="2">
+            <a:schemeClr val="accent1">
+              <a:shade val="50000"/>
+            </a:schemeClr>
+          </a:lnRef>
+          <a:fillRef idx="1">
+            <a:schemeClr val="accent1"/>
+          </a:fillRef>
+          <a:effectRef idx="0">
+            <a:schemeClr val="accent1"/>
+          </a:effectRef>
+          <a:fontRef idx="minor">
+            <a:schemeClr val="lt1"/>
+          </a:fontRef>
+        </p:style>
+        <p:txBody>
+          <a:bodyPr rtlCol="0" anchor="ctr"/>
+          <a:lstStyle/>
+          <a:p>
+            <a:pPr algn="ctr"/>
+            <a:endParaRPr lang="en-US"/>
+          </a:p>
+        </p:txBody>
+      </p:sp>
+      <p:sp>
+        <p:nvSpPr>
+          <p:cNvPr id="10" name="TextBox 9"/>
+          <p:cNvSpPr txBox="1"/>
+          <p:nvPr/>
+        </p:nvSpPr>
+        <p:spPr>
+          <a:xfrm>
+            <a:off x="2514600" y="2250817"/>
+            <a:ext cx="1828800" cy="369332"/>
+          </a:xfrm>
+          <a:prstGeom prst="rect">
+            <a:avLst/>
+          </a:prstGeom>
+          <a:noFill/>
+        </p:spPr>
+        <p:txBody>
+          <a:bodyPr wrap="square" rtlCol="0">
+            <a:spAutoFit/>
+          </a:bodyPr>
+          <a:lstStyle/>
+          <a:p>
+            <a:pPr algn="r" rtl="1"/>
+            <a:r>
+              <a:rPr lang="he-IL" dirty="0"/>
+              <a:t>איתור מקרי </a:t>
+            </a:r>
+            <a:r>
+              <a:rPr lang="he-IL" dirty="0" smtClean="0"/>
+              <a:t>קצה</a:t>
+            </a:r>
+            <a:endParaRPr lang="he-IL" dirty="0"/>
+          </a:p>
+        </p:txBody>
+      </p:sp>
+      <p:sp>
+        <p:nvSpPr>
+          <p:cNvPr id="12" name="TextBox 11"/>
+          <p:cNvSpPr txBox="1"/>
+          <p:nvPr/>
+        </p:nvSpPr>
+        <p:spPr>
+          <a:xfrm>
+            <a:off x="481012" y="2254507"/>
+            <a:ext cx="1828800" cy="369332"/>
+          </a:xfrm>
+          <a:prstGeom prst="rect">
+            <a:avLst/>
+          </a:prstGeom>
+          <a:noFill/>
+        </p:spPr>
+        <p:txBody>
+          <a:bodyPr wrap="square" rtlCol="0">
+            <a:spAutoFit/>
+          </a:bodyPr>
+          <a:lstStyle/>
+          <a:p>
+            <a:pPr algn="r" rtl="1"/>
+            <a:r>
+              <a:rPr lang="he-IL" dirty="0"/>
+              <a:t>בניית סימולטור</a:t>
+            </a:r>
           </a:p>
         </p:txBody>
       </p:sp>
     </p:spTree>
     <p:extLst>
       <p:ext uri="{BB962C8B-B14F-4D97-AF65-F5344CB8AC3E}">
-        <p14:creationId xmlns:p14="http://schemas.microsoft.com/office/powerpoint/2010/main" val="1518886079"/>
+        <p14:creationId xmlns:p14="http://schemas.microsoft.com/office/powerpoint/2010/main" val="3256834041"/>
       </p:ext>
     </p:extLst>
   </p:cSld>
   <p:clrMapOvr>
     <a:masterClrMapping/>
   </p:clrMapOvr>
-  <p:timing>
-    <p:tnLst>
-      <p:par>
-        <p:cTn id="1" dur="indefinite" restart="never" nodeType="tmRoot"/>
-      </p:par>
-    </p:tnLst>
-  </p:timing>
 </p:sld>
 </file>
 
@@ -10227,6 +10979,33 @@
       </p:grpSpPr>
       <p:sp>
         <p:nvSpPr>
+          <p:cNvPr id="2" name="Content Placeholder 1"/>
+          <p:cNvSpPr>
+            <a:spLocks noGrp="1"/>
+          </p:cNvSpPr>
+          <p:nvPr>
+            <p:ph idx="1"/>
+          </p:nvPr>
+        </p:nvSpPr>
+        <p:spPr>
+          <a:xfrm>
+            <a:off x="699247" y="3505200"/>
+            <a:ext cx="7745505" cy="2620962"/>
+          </a:xfrm>
+        </p:spPr>
+        <p:txBody>
+          <a:bodyPr/>
+          <a:lstStyle/>
+          <a:p>
+            <a:pPr marL="0" indent="0" algn="r" rtl="1">
+              <a:buNone/>
+            </a:pPr>
+            <a:endParaRPr lang="en-US" dirty="0"/>
+          </a:p>
+        </p:txBody>
+      </p:sp>
+      <p:sp>
+        <p:nvSpPr>
           <p:cNvPr id="3" name="Title 2"/>
           <p:cNvSpPr>
             <a:spLocks noGrp="1"/>
@@ -10240,61 +11019,368 @@
           <a:bodyPr/>
           <a:lstStyle/>
           <a:p>
+            <a:pPr rtl="1"/>
             <a:r>
               <a:rPr lang="he-IL" dirty="0" smtClean="0"/>
-              <a:t>הצגת יעדים מעודכנים</a:t>
+              <a:t>דרישות המרכיבים</a:t>
             </a:r>
             <a:endParaRPr lang="en-US" dirty="0"/>
           </a:p>
         </p:txBody>
       </p:sp>
-      <p:pic>
-        <p:nvPicPr>
-          <p:cNvPr id="4" name="Picture 3"/>
-          <p:cNvPicPr>
-            <a:picLocks noChangeAspect="1"/>
-          </p:cNvPicPr>
+      <p:sp>
+        <p:nvSpPr>
+          <p:cNvPr id="5" name="Bevel 4"/>
+          <p:cNvSpPr/>
           <p:nvPr/>
-        </p:nvPicPr>
-        <p:blipFill>
-          <a:blip r:embed="rId3">
-            <a:extLst>
-              <a:ext uri="{28A0092B-C50C-407E-A947-70E740481C1C}">
-                <a14:useLocalDpi xmlns:a14="http://schemas.microsoft.com/office/drawing/2010/main" val="0"/>
-              </a:ext>
-            </a:extLst>
-          </a:blip>
-          <a:stretch>
-            <a:fillRect/>
-          </a:stretch>
-        </p:blipFill>
-        <p:spPr>
-          <a:xfrm>
-            <a:off x="0" y="2133600"/>
-            <a:ext cx="9144000" cy="4212404"/>
+        </p:nvSpPr>
+        <p:spPr>
+          <a:xfrm>
+            <a:off x="6562725" y="2143899"/>
+            <a:ext cx="2057400" cy="599301"/>
+          </a:xfrm>
+          <a:prstGeom prst="bevel">
+            <a:avLst/>
+          </a:prstGeom>
+          <a:solidFill>
+            <a:srgbClr val="FFC000"/>
+          </a:solidFill>
+        </p:spPr>
+        <p:style>
+          <a:lnRef idx="2">
+            <a:schemeClr val="accent1">
+              <a:shade val="50000"/>
+            </a:schemeClr>
+          </a:lnRef>
+          <a:fillRef idx="1">
+            <a:schemeClr val="accent1"/>
+          </a:fillRef>
+          <a:effectRef idx="0">
+            <a:schemeClr val="accent1"/>
+          </a:effectRef>
+          <a:fontRef idx="minor">
+            <a:schemeClr val="lt1"/>
+          </a:fontRef>
+        </p:style>
+        <p:txBody>
+          <a:bodyPr rtlCol="0" anchor="ctr"/>
+          <a:lstStyle/>
+          <a:p>
+            <a:pPr algn="ctr"/>
+            <a:endParaRPr lang="en-US"/>
+          </a:p>
+        </p:txBody>
+      </p:sp>
+      <p:sp>
+        <p:nvSpPr>
+          <p:cNvPr id="6" name="Bevel 5"/>
+          <p:cNvSpPr/>
+          <p:nvPr/>
+        </p:nvSpPr>
+        <p:spPr>
+          <a:xfrm>
+            <a:off x="4495800" y="2143899"/>
+            <a:ext cx="2057400" cy="599301"/>
+          </a:xfrm>
+          <a:prstGeom prst="bevel">
+            <a:avLst/>
+          </a:prstGeom>
+          <a:gradFill>
+            <a:gsLst>
+              <a:gs pos="0">
+                <a:srgbClr val="FFEFD1"/>
+              </a:gs>
+              <a:gs pos="64999">
+                <a:srgbClr val="F0EBD5"/>
+              </a:gs>
+              <a:gs pos="100000">
+                <a:srgbClr val="D1C39F"/>
+              </a:gs>
+            </a:gsLst>
+            <a:lin ang="0" scaled="0"/>
+          </a:gradFill>
+        </p:spPr>
+        <p:style>
+          <a:lnRef idx="2">
+            <a:schemeClr val="accent1">
+              <a:shade val="50000"/>
+            </a:schemeClr>
+          </a:lnRef>
+          <a:fillRef idx="1">
+            <a:schemeClr val="accent1"/>
+          </a:fillRef>
+          <a:effectRef idx="0">
+            <a:schemeClr val="accent1"/>
+          </a:effectRef>
+          <a:fontRef idx="minor">
+            <a:schemeClr val="lt1"/>
+          </a:fontRef>
+        </p:style>
+        <p:txBody>
+          <a:bodyPr rtlCol="0" anchor="ctr"/>
+          <a:lstStyle/>
+          <a:p>
+            <a:pPr algn="ctr"/>
+            <a:endParaRPr lang="en-US"/>
+          </a:p>
+        </p:txBody>
+      </p:sp>
+      <p:sp>
+        <p:nvSpPr>
+          <p:cNvPr id="7" name="Bevel 6"/>
+          <p:cNvSpPr/>
+          <p:nvPr/>
+        </p:nvSpPr>
+        <p:spPr>
+          <a:xfrm>
+            <a:off x="2428875" y="2143899"/>
+            <a:ext cx="2066925" cy="599301"/>
+          </a:xfrm>
+          <a:prstGeom prst="bevel">
+            <a:avLst/>
+          </a:prstGeom>
+          <a:gradFill>
+            <a:gsLst>
+              <a:gs pos="0">
+                <a:srgbClr val="FFEFD1"/>
+              </a:gs>
+              <a:gs pos="64999">
+                <a:srgbClr val="F0EBD5"/>
+              </a:gs>
+              <a:gs pos="100000">
+                <a:srgbClr val="D1C39F"/>
+              </a:gs>
+            </a:gsLst>
+            <a:lin ang="0" scaled="0"/>
+          </a:gradFill>
+        </p:spPr>
+        <p:style>
+          <a:lnRef idx="2">
+            <a:schemeClr val="accent1">
+              <a:shade val="50000"/>
+            </a:schemeClr>
+          </a:lnRef>
+          <a:fillRef idx="1">
+            <a:schemeClr val="accent1"/>
+          </a:fillRef>
+          <a:effectRef idx="0">
+            <a:schemeClr val="accent1"/>
+          </a:effectRef>
+          <a:fontRef idx="minor">
+            <a:schemeClr val="lt1"/>
+          </a:fontRef>
+        </p:style>
+        <p:txBody>
+          <a:bodyPr rtlCol="0" anchor="ctr"/>
+          <a:lstStyle/>
+          <a:p>
+            <a:pPr algn="ctr"/>
+            <a:endParaRPr lang="en-US"/>
+          </a:p>
+        </p:txBody>
+      </p:sp>
+      <p:sp>
+        <p:nvSpPr>
+          <p:cNvPr id="8" name="TextBox 7"/>
+          <p:cNvSpPr txBox="1"/>
+          <p:nvPr/>
+        </p:nvSpPr>
+        <p:spPr>
+          <a:xfrm>
+            <a:off x="6562725" y="2239833"/>
+            <a:ext cx="1905000" cy="369332"/>
           </a:xfrm>
           <a:prstGeom prst="rect">
             <a:avLst/>
           </a:prstGeom>
-        </p:spPr>
-      </p:pic>
+          <a:noFill/>
+        </p:spPr>
+        <p:txBody>
+          <a:bodyPr wrap="square" rtlCol="0">
+            <a:spAutoFit/>
+          </a:bodyPr>
+          <a:lstStyle/>
+          <a:p>
+            <a:pPr algn="r" rtl="1"/>
+            <a:r>
+              <a:rPr lang="he-IL" dirty="0" smtClean="0"/>
+              <a:t>דגימת </a:t>
+            </a:r>
+            <a:r>
+              <a:rPr lang="he-IL" dirty="0"/>
+              <a:t>תנאי </a:t>
+            </a:r>
+            <a:r>
+              <a:rPr lang="he-IL" dirty="0" smtClean="0"/>
+              <a:t>סביבה</a:t>
+            </a:r>
+            <a:endParaRPr lang="en-US" dirty="0"/>
+          </a:p>
+        </p:txBody>
+      </p:sp>
+      <p:sp>
+        <p:nvSpPr>
+          <p:cNvPr id="9" name="TextBox 8"/>
+          <p:cNvSpPr txBox="1"/>
+          <p:nvPr/>
+        </p:nvSpPr>
+        <p:spPr>
+          <a:xfrm>
+            <a:off x="4648200" y="2239832"/>
+            <a:ext cx="1828800" cy="369332"/>
+          </a:xfrm>
+          <a:prstGeom prst="rect">
+            <a:avLst/>
+          </a:prstGeom>
+          <a:noFill/>
+        </p:spPr>
+        <p:txBody>
+          <a:bodyPr wrap="square" rtlCol="0">
+            <a:spAutoFit/>
+          </a:bodyPr>
+          <a:lstStyle/>
+          <a:p>
+            <a:pPr algn="r" rtl="1"/>
+            <a:r>
+              <a:rPr lang="he-IL" dirty="0" smtClean="0"/>
+              <a:t>ניתוח </a:t>
+            </a:r>
+            <a:r>
+              <a:rPr lang="he-IL" dirty="0"/>
+              <a:t>הנתונים</a:t>
+            </a:r>
+          </a:p>
+        </p:txBody>
+      </p:sp>
+      <p:sp>
+        <p:nvSpPr>
+          <p:cNvPr id="11" name="Bevel 10"/>
+          <p:cNvSpPr/>
+          <p:nvPr/>
+        </p:nvSpPr>
+        <p:spPr>
+          <a:xfrm>
+            <a:off x="361950" y="2143899"/>
+            <a:ext cx="2066925" cy="599301"/>
+          </a:xfrm>
+          <a:prstGeom prst="bevel">
+            <a:avLst/>
+          </a:prstGeom>
+          <a:gradFill>
+            <a:gsLst>
+              <a:gs pos="0">
+                <a:srgbClr val="FFEFD1"/>
+              </a:gs>
+              <a:gs pos="64999">
+                <a:srgbClr val="F0EBD5"/>
+              </a:gs>
+              <a:gs pos="100000">
+                <a:srgbClr val="D1C39F"/>
+              </a:gs>
+            </a:gsLst>
+            <a:lin ang="0" scaled="0"/>
+          </a:gradFill>
+        </p:spPr>
+        <p:style>
+          <a:lnRef idx="2">
+            <a:schemeClr val="accent1">
+              <a:shade val="50000"/>
+            </a:schemeClr>
+          </a:lnRef>
+          <a:fillRef idx="1">
+            <a:schemeClr val="accent1"/>
+          </a:fillRef>
+          <a:effectRef idx="0">
+            <a:schemeClr val="accent1"/>
+          </a:effectRef>
+          <a:fontRef idx="minor">
+            <a:schemeClr val="lt1"/>
+          </a:fontRef>
+        </p:style>
+        <p:txBody>
+          <a:bodyPr rtlCol="0" anchor="ctr"/>
+          <a:lstStyle/>
+          <a:p>
+            <a:pPr algn="ctr"/>
+            <a:endParaRPr lang="en-US"/>
+          </a:p>
+        </p:txBody>
+      </p:sp>
+      <p:sp>
+        <p:nvSpPr>
+          <p:cNvPr id="10" name="TextBox 9"/>
+          <p:cNvSpPr txBox="1"/>
+          <p:nvPr/>
+        </p:nvSpPr>
+        <p:spPr>
+          <a:xfrm>
+            <a:off x="2514600" y="2250817"/>
+            <a:ext cx="1828800" cy="369332"/>
+          </a:xfrm>
+          <a:prstGeom prst="rect">
+            <a:avLst/>
+          </a:prstGeom>
+          <a:noFill/>
+        </p:spPr>
+        <p:txBody>
+          <a:bodyPr wrap="square" rtlCol="0">
+            <a:spAutoFit/>
+          </a:bodyPr>
+          <a:lstStyle/>
+          <a:p>
+            <a:pPr algn="r" rtl="1"/>
+            <a:r>
+              <a:rPr lang="he-IL" dirty="0"/>
+              <a:t>איתור מקרי </a:t>
+            </a:r>
+            <a:r>
+              <a:rPr lang="he-IL" dirty="0" smtClean="0"/>
+              <a:t>קצה</a:t>
+            </a:r>
+            <a:endParaRPr lang="he-IL" dirty="0"/>
+          </a:p>
+        </p:txBody>
+      </p:sp>
+      <p:sp>
+        <p:nvSpPr>
+          <p:cNvPr id="12" name="TextBox 11"/>
+          <p:cNvSpPr txBox="1"/>
+          <p:nvPr/>
+        </p:nvSpPr>
+        <p:spPr>
+          <a:xfrm>
+            <a:off x="481012" y="2254507"/>
+            <a:ext cx="1828800" cy="369332"/>
+          </a:xfrm>
+          <a:prstGeom prst="rect">
+            <a:avLst/>
+          </a:prstGeom>
+          <a:noFill/>
+        </p:spPr>
+        <p:txBody>
+          <a:bodyPr wrap="square" rtlCol="0">
+            <a:spAutoFit/>
+          </a:bodyPr>
+          <a:lstStyle/>
+          <a:p>
+            <a:pPr algn="r" rtl="1"/>
+            <a:r>
+              <a:rPr lang="he-IL" dirty="0"/>
+              <a:t>בניית סימולטור</a:t>
+            </a:r>
+          </a:p>
+        </p:txBody>
+      </p:sp>
     </p:spTree>
     <p:extLst>
       <p:ext uri="{BB962C8B-B14F-4D97-AF65-F5344CB8AC3E}">
-        <p14:creationId xmlns:p14="http://schemas.microsoft.com/office/powerpoint/2010/main" val="3281705225"/>
+        <p14:creationId xmlns:p14="http://schemas.microsoft.com/office/powerpoint/2010/main" val="3256834041"/>
       </p:ext>
     </p:extLst>
   </p:cSld>
   <p:clrMapOvr>
     <a:masterClrMapping/>
   </p:clrMapOvr>
-  <p:timing>
-    <p:tnLst>
-      <p:par>
-        <p:cTn id="1" dur="indefinite" restart="never" nodeType="tmRoot"/>
-      </p:par>
-    </p:tnLst>
-  </p:timing>
 </p:sld>
 </file>
 
@@ -10325,37 +11411,20 @@
             <p:ph idx="1"/>
           </p:nvPr>
         </p:nvSpPr>
-        <p:spPr/>
+        <p:spPr>
+          <a:xfrm>
+            <a:off x="699247" y="3505200"/>
+            <a:ext cx="7745505" cy="2620962"/>
+          </a:xfrm>
+        </p:spPr>
         <p:txBody>
           <a:bodyPr/>
           <a:lstStyle/>
           <a:p>
-            <a:pPr algn="l"/>
-            <a:r>
-              <a:rPr lang="en-US" dirty="0" smtClean="0"/>
-              <a:t>802.11 SPEC</a:t>
-            </a:r>
-          </a:p>
-          <a:p>
-            <a:pPr algn="l"/>
-            <a:endParaRPr lang="en-US" dirty="0" smtClean="0"/>
-          </a:p>
-          <a:p>
-            <a:pPr algn="l"/>
-            <a:r>
-              <a:rPr lang="en-US" dirty="0" err="1" smtClean="0"/>
-              <a:t>WiFi</a:t>
-            </a:r>
-            <a:r>
-              <a:rPr lang="en-US" dirty="0" smtClean="0"/>
-              <a:t> Alliance</a:t>
-            </a:r>
-          </a:p>
-          <a:p>
-            <a:pPr marL="0" indent="0" algn="l">
+            <a:pPr marL="0" indent="0" algn="r" rtl="1">
               <a:buNone/>
             </a:pPr>
-            <a:endParaRPr lang="en-US" dirty="0" smtClean="0"/>
+            <a:endParaRPr lang="en-US" dirty="0"/>
           </a:p>
         </p:txBody>
       </p:sp>
@@ -10374,31 +11443,368 @@
           <a:bodyPr/>
           <a:lstStyle/>
           <a:p>
+            <a:pPr rtl="1"/>
             <a:r>
               <a:rPr lang="he-IL" dirty="0" smtClean="0"/>
-              <a:t>ביבליוגרפיה</a:t>
+              <a:t>דרישות המרכיבים</a:t>
             </a:r>
             <a:endParaRPr lang="en-US" dirty="0"/>
+          </a:p>
+        </p:txBody>
+      </p:sp>
+      <p:sp>
+        <p:nvSpPr>
+          <p:cNvPr id="5" name="Bevel 4"/>
+          <p:cNvSpPr/>
+          <p:nvPr/>
+        </p:nvSpPr>
+        <p:spPr>
+          <a:xfrm>
+            <a:off x="6562725" y="2143899"/>
+            <a:ext cx="2057400" cy="599301"/>
+          </a:xfrm>
+          <a:prstGeom prst="bevel">
+            <a:avLst/>
+          </a:prstGeom>
+          <a:solidFill>
+            <a:srgbClr val="FFC000"/>
+          </a:solidFill>
+        </p:spPr>
+        <p:style>
+          <a:lnRef idx="2">
+            <a:schemeClr val="accent1">
+              <a:shade val="50000"/>
+            </a:schemeClr>
+          </a:lnRef>
+          <a:fillRef idx="1">
+            <a:schemeClr val="accent1"/>
+          </a:fillRef>
+          <a:effectRef idx="0">
+            <a:schemeClr val="accent1"/>
+          </a:effectRef>
+          <a:fontRef idx="minor">
+            <a:schemeClr val="lt1"/>
+          </a:fontRef>
+        </p:style>
+        <p:txBody>
+          <a:bodyPr rtlCol="0" anchor="ctr"/>
+          <a:lstStyle/>
+          <a:p>
+            <a:pPr algn="ctr"/>
+            <a:endParaRPr lang="en-US"/>
+          </a:p>
+        </p:txBody>
+      </p:sp>
+      <p:sp>
+        <p:nvSpPr>
+          <p:cNvPr id="6" name="Bevel 5"/>
+          <p:cNvSpPr/>
+          <p:nvPr/>
+        </p:nvSpPr>
+        <p:spPr>
+          <a:xfrm>
+            <a:off x="4495800" y="2143899"/>
+            <a:ext cx="2057400" cy="599301"/>
+          </a:xfrm>
+          <a:prstGeom prst="bevel">
+            <a:avLst/>
+          </a:prstGeom>
+          <a:gradFill>
+            <a:gsLst>
+              <a:gs pos="0">
+                <a:srgbClr val="FFEFD1"/>
+              </a:gs>
+              <a:gs pos="64999">
+                <a:srgbClr val="F0EBD5"/>
+              </a:gs>
+              <a:gs pos="100000">
+                <a:srgbClr val="D1C39F"/>
+              </a:gs>
+            </a:gsLst>
+            <a:lin ang="0" scaled="0"/>
+          </a:gradFill>
+        </p:spPr>
+        <p:style>
+          <a:lnRef idx="2">
+            <a:schemeClr val="accent1">
+              <a:shade val="50000"/>
+            </a:schemeClr>
+          </a:lnRef>
+          <a:fillRef idx="1">
+            <a:schemeClr val="accent1"/>
+          </a:fillRef>
+          <a:effectRef idx="0">
+            <a:schemeClr val="accent1"/>
+          </a:effectRef>
+          <a:fontRef idx="minor">
+            <a:schemeClr val="lt1"/>
+          </a:fontRef>
+        </p:style>
+        <p:txBody>
+          <a:bodyPr rtlCol="0" anchor="ctr"/>
+          <a:lstStyle/>
+          <a:p>
+            <a:pPr algn="ctr"/>
+            <a:endParaRPr lang="en-US"/>
+          </a:p>
+        </p:txBody>
+      </p:sp>
+      <p:sp>
+        <p:nvSpPr>
+          <p:cNvPr id="7" name="Bevel 6"/>
+          <p:cNvSpPr/>
+          <p:nvPr/>
+        </p:nvSpPr>
+        <p:spPr>
+          <a:xfrm>
+            <a:off x="2428875" y="2143899"/>
+            <a:ext cx="2066925" cy="599301"/>
+          </a:xfrm>
+          <a:prstGeom prst="bevel">
+            <a:avLst/>
+          </a:prstGeom>
+          <a:gradFill>
+            <a:gsLst>
+              <a:gs pos="0">
+                <a:srgbClr val="FFEFD1"/>
+              </a:gs>
+              <a:gs pos="64999">
+                <a:srgbClr val="F0EBD5"/>
+              </a:gs>
+              <a:gs pos="100000">
+                <a:srgbClr val="D1C39F"/>
+              </a:gs>
+            </a:gsLst>
+            <a:lin ang="0" scaled="0"/>
+          </a:gradFill>
+        </p:spPr>
+        <p:style>
+          <a:lnRef idx="2">
+            <a:schemeClr val="accent1">
+              <a:shade val="50000"/>
+            </a:schemeClr>
+          </a:lnRef>
+          <a:fillRef idx="1">
+            <a:schemeClr val="accent1"/>
+          </a:fillRef>
+          <a:effectRef idx="0">
+            <a:schemeClr val="accent1"/>
+          </a:effectRef>
+          <a:fontRef idx="minor">
+            <a:schemeClr val="lt1"/>
+          </a:fontRef>
+        </p:style>
+        <p:txBody>
+          <a:bodyPr rtlCol="0" anchor="ctr"/>
+          <a:lstStyle/>
+          <a:p>
+            <a:pPr algn="ctr"/>
+            <a:endParaRPr lang="en-US"/>
+          </a:p>
+        </p:txBody>
+      </p:sp>
+      <p:sp>
+        <p:nvSpPr>
+          <p:cNvPr id="8" name="TextBox 7"/>
+          <p:cNvSpPr txBox="1"/>
+          <p:nvPr/>
+        </p:nvSpPr>
+        <p:spPr>
+          <a:xfrm>
+            <a:off x="6562725" y="2239833"/>
+            <a:ext cx="1905000" cy="369332"/>
+          </a:xfrm>
+          <a:prstGeom prst="rect">
+            <a:avLst/>
+          </a:prstGeom>
+          <a:noFill/>
+        </p:spPr>
+        <p:txBody>
+          <a:bodyPr wrap="square" rtlCol="0">
+            <a:spAutoFit/>
+          </a:bodyPr>
+          <a:lstStyle/>
+          <a:p>
+            <a:pPr algn="r" rtl="1"/>
+            <a:r>
+              <a:rPr lang="he-IL" dirty="0" smtClean="0"/>
+              <a:t>דגימת </a:t>
+            </a:r>
+            <a:r>
+              <a:rPr lang="he-IL" dirty="0"/>
+              <a:t>תנאי </a:t>
+            </a:r>
+            <a:r>
+              <a:rPr lang="he-IL" dirty="0" smtClean="0"/>
+              <a:t>סביבה</a:t>
+            </a:r>
+            <a:endParaRPr lang="en-US" dirty="0"/>
+          </a:p>
+        </p:txBody>
+      </p:sp>
+      <p:sp>
+        <p:nvSpPr>
+          <p:cNvPr id="9" name="TextBox 8"/>
+          <p:cNvSpPr txBox="1"/>
+          <p:nvPr/>
+        </p:nvSpPr>
+        <p:spPr>
+          <a:xfrm>
+            <a:off x="4648200" y="2239832"/>
+            <a:ext cx="1828800" cy="369332"/>
+          </a:xfrm>
+          <a:prstGeom prst="rect">
+            <a:avLst/>
+          </a:prstGeom>
+          <a:noFill/>
+        </p:spPr>
+        <p:txBody>
+          <a:bodyPr wrap="square" rtlCol="0">
+            <a:spAutoFit/>
+          </a:bodyPr>
+          <a:lstStyle/>
+          <a:p>
+            <a:pPr algn="r" rtl="1"/>
+            <a:r>
+              <a:rPr lang="he-IL" dirty="0" smtClean="0"/>
+              <a:t>ניתוח </a:t>
+            </a:r>
+            <a:r>
+              <a:rPr lang="he-IL" dirty="0"/>
+              <a:t>הנתונים</a:t>
+            </a:r>
+          </a:p>
+        </p:txBody>
+      </p:sp>
+      <p:sp>
+        <p:nvSpPr>
+          <p:cNvPr id="11" name="Bevel 10"/>
+          <p:cNvSpPr/>
+          <p:nvPr/>
+        </p:nvSpPr>
+        <p:spPr>
+          <a:xfrm>
+            <a:off x="361950" y="2143899"/>
+            <a:ext cx="2066925" cy="599301"/>
+          </a:xfrm>
+          <a:prstGeom prst="bevel">
+            <a:avLst/>
+          </a:prstGeom>
+          <a:gradFill>
+            <a:gsLst>
+              <a:gs pos="0">
+                <a:srgbClr val="FFEFD1"/>
+              </a:gs>
+              <a:gs pos="64999">
+                <a:srgbClr val="F0EBD5"/>
+              </a:gs>
+              <a:gs pos="100000">
+                <a:srgbClr val="D1C39F"/>
+              </a:gs>
+            </a:gsLst>
+            <a:lin ang="0" scaled="0"/>
+          </a:gradFill>
+        </p:spPr>
+        <p:style>
+          <a:lnRef idx="2">
+            <a:schemeClr val="accent1">
+              <a:shade val="50000"/>
+            </a:schemeClr>
+          </a:lnRef>
+          <a:fillRef idx="1">
+            <a:schemeClr val="accent1"/>
+          </a:fillRef>
+          <a:effectRef idx="0">
+            <a:schemeClr val="accent1"/>
+          </a:effectRef>
+          <a:fontRef idx="minor">
+            <a:schemeClr val="lt1"/>
+          </a:fontRef>
+        </p:style>
+        <p:txBody>
+          <a:bodyPr rtlCol="0" anchor="ctr"/>
+          <a:lstStyle/>
+          <a:p>
+            <a:pPr algn="ctr"/>
+            <a:endParaRPr lang="en-US"/>
+          </a:p>
+        </p:txBody>
+      </p:sp>
+      <p:sp>
+        <p:nvSpPr>
+          <p:cNvPr id="10" name="TextBox 9"/>
+          <p:cNvSpPr txBox="1"/>
+          <p:nvPr/>
+        </p:nvSpPr>
+        <p:spPr>
+          <a:xfrm>
+            <a:off x="2514600" y="2250817"/>
+            <a:ext cx="1828800" cy="369332"/>
+          </a:xfrm>
+          <a:prstGeom prst="rect">
+            <a:avLst/>
+          </a:prstGeom>
+          <a:noFill/>
+        </p:spPr>
+        <p:txBody>
+          <a:bodyPr wrap="square" rtlCol="0">
+            <a:spAutoFit/>
+          </a:bodyPr>
+          <a:lstStyle/>
+          <a:p>
+            <a:pPr algn="r" rtl="1"/>
+            <a:r>
+              <a:rPr lang="he-IL" dirty="0"/>
+              <a:t>איתור מקרי </a:t>
+            </a:r>
+            <a:r>
+              <a:rPr lang="he-IL" dirty="0" smtClean="0"/>
+              <a:t>קצה</a:t>
+            </a:r>
+            <a:endParaRPr lang="he-IL" dirty="0"/>
+          </a:p>
+        </p:txBody>
+      </p:sp>
+      <p:sp>
+        <p:nvSpPr>
+          <p:cNvPr id="12" name="TextBox 11"/>
+          <p:cNvSpPr txBox="1"/>
+          <p:nvPr/>
+        </p:nvSpPr>
+        <p:spPr>
+          <a:xfrm>
+            <a:off x="481012" y="2254507"/>
+            <a:ext cx="1828800" cy="369332"/>
+          </a:xfrm>
+          <a:prstGeom prst="rect">
+            <a:avLst/>
+          </a:prstGeom>
+          <a:noFill/>
+        </p:spPr>
+        <p:txBody>
+          <a:bodyPr wrap="square" rtlCol="0">
+            <a:spAutoFit/>
+          </a:bodyPr>
+          <a:lstStyle/>
+          <a:p>
+            <a:pPr algn="r" rtl="1"/>
+            <a:r>
+              <a:rPr lang="he-IL" dirty="0"/>
+              <a:t>בניית סימולטור</a:t>
+            </a:r>
           </a:p>
         </p:txBody>
       </p:sp>
     </p:spTree>
     <p:extLst>
       <p:ext uri="{BB962C8B-B14F-4D97-AF65-F5344CB8AC3E}">
-        <p14:creationId xmlns:p14="http://schemas.microsoft.com/office/powerpoint/2010/main" val="1224788635"/>
+        <p14:creationId xmlns:p14="http://schemas.microsoft.com/office/powerpoint/2010/main" val="3256834041"/>
       </p:ext>
     </p:extLst>
   </p:cSld>
   <p:clrMapOvr>
     <a:masterClrMapping/>
   </p:clrMapOvr>
-  <p:timing>
-    <p:tnLst>
-      <p:par>
-        <p:cTn id="1" dur="indefinite" restart="never" nodeType="tmRoot"/>
-      </p:par>
-    </p:tnLst>
-  </p:timing>
 </p:sld>
 </file>
 
@@ -10463,7 +11869,7 @@
         </p:nvGraphicFramePr>
         <p:xfrm>
           <a:off x="228600" y="2057401"/>
-          <a:ext cx="8534400" cy="4571998"/>
+          <a:ext cx="8534400" cy="4612670"/>
         </p:xfrm>
         <a:graphic>
           <a:graphicData uri="http://schemas.openxmlformats.org/drawingml/2006/table">
@@ -11127,6 +12533,420 @@
 </p:sld>
 </file>
 
+<file path=ppt/slides/slide20.xml><?xml version="1.0" encoding="utf-8"?>
+<p:sld xmlns:a="http://schemas.openxmlformats.org/drawingml/2006/main" xmlns:r="http://schemas.openxmlformats.org/officeDocument/2006/relationships" xmlns:p="http://schemas.openxmlformats.org/presentationml/2006/main">
+  <p:cSld>
+    <p:spTree>
+      <p:nvGrpSpPr>
+        <p:cNvPr id="1" name=""/>
+        <p:cNvGrpSpPr/>
+        <p:nvPr/>
+      </p:nvGrpSpPr>
+      <p:grpSpPr>
+        <a:xfrm>
+          <a:off x="0" y="0"/>
+          <a:ext cx="0" cy="0"/>
+          <a:chOff x="0" y="0"/>
+          <a:chExt cx="0" cy="0"/>
+        </a:xfrm>
+      </p:grpSpPr>
+      <p:sp>
+        <p:nvSpPr>
+          <p:cNvPr id="2" name="Content Placeholder 1"/>
+          <p:cNvSpPr>
+            <a:spLocks noGrp="1"/>
+          </p:cNvSpPr>
+          <p:nvPr>
+            <p:ph idx="1"/>
+          </p:nvPr>
+        </p:nvSpPr>
+        <p:spPr>
+          <a:xfrm>
+            <a:off x="0" y="1981200"/>
+            <a:ext cx="9143999" cy="4876799"/>
+          </a:xfrm>
+        </p:spPr>
+        <p:txBody>
+          <a:bodyPr>
+            <a:normAutofit/>
+          </a:bodyPr>
+          <a:lstStyle/>
+          <a:p>
+            <a:pPr algn="r" rtl="1"/>
+            <a:r>
+              <a:rPr lang="he-IL" dirty="0" smtClean="0"/>
+              <a:t>למידת פרוטוקולי </a:t>
+            </a:r>
+            <a:r>
+              <a:rPr lang="en-US" dirty="0" smtClean="0"/>
+              <a:t>WIFI</a:t>
+            </a:r>
+            <a:endParaRPr lang="he-IL" dirty="0" smtClean="0"/>
+          </a:p>
+          <a:p>
+            <a:pPr lvl="1" algn="r" rtl="1"/>
+            <a:r>
+              <a:rPr lang="en-US" dirty="0" smtClean="0"/>
+              <a:t>DRS</a:t>
+            </a:r>
+            <a:r>
+              <a:rPr lang="he-IL" dirty="0" smtClean="0"/>
+              <a:t>,</a:t>
+            </a:r>
+            <a:r>
+              <a:rPr lang="en-US" dirty="0" smtClean="0"/>
+              <a:t>TDLS</a:t>
+            </a:r>
+            <a:r>
+              <a:rPr lang="he-IL" dirty="0" smtClean="0"/>
+              <a:t>,</a:t>
+            </a:r>
+            <a:r>
+              <a:rPr lang="en-US" dirty="0" smtClean="0"/>
+              <a:t>BSS</a:t>
+            </a:r>
+            <a:endParaRPr lang="he-IL" dirty="0" smtClean="0"/>
+          </a:p>
+          <a:p>
+            <a:pPr algn="r" rtl="1"/>
+            <a:r>
+              <a:rPr lang="he-IL" dirty="0" smtClean="0"/>
+              <a:t>הכרת אופן ביצוע מחקר בעולם התקשורת של מחקרים קיימים</a:t>
+            </a:r>
+          </a:p>
+          <a:p>
+            <a:pPr algn="r" rtl="1"/>
+            <a:r>
+              <a:rPr lang="he-IL" dirty="0" smtClean="0"/>
+              <a:t>בניית סימולטור </a:t>
+            </a:r>
+          </a:p>
+          <a:p>
+            <a:pPr lvl="1" algn="r" rtl="1"/>
+            <a:r>
+              <a:rPr lang="he-IL" dirty="0" smtClean="0"/>
+              <a:t>מנגנון </a:t>
+            </a:r>
+            <a:r>
+              <a:rPr lang="en-US" dirty="0" smtClean="0"/>
+              <a:t>PRESENTOR</a:t>
+            </a:r>
+            <a:endParaRPr lang="he-IL" dirty="0" smtClean="0"/>
+          </a:p>
+          <a:p>
+            <a:pPr lvl="1" algn="r" rtl="1"/>
+            <a:r>
+              <a:rPr lang="he-IL" dirty="0" smtClean="0"/>
+              <a:t>יצירת מודולים ראשיים בצורה גנרית ככל הניתן: </a:t>
+            </a:r>
+            <a:r>
+              <a:rPr lang="en-US" dirty="0" smtClean="0"/>
+              <a:t>AP</a:t>
+            </a:r>
+            <a:r>
+              <a:rPr lang="he-IL" dirty="0" smtClean="0"/>
+              <a:t>,</a:t>
+            </a:r>
+            <a:r>
+              <a:rPr lang="en-US" dirty="0" smtClean="0"/>
+              <a:t>MEADIUM</a:t>
+            </a:r>
+            <a:r>
+              <a:rPr lang="he-IL" dirty="0" smtClean="0"/>
+              <a:t>,</a:t>
+            </a:r>
+            <a:r>
+              <a:rPr lang="en-US" dirty="0" smtClean="0"/>
+              <a:t>STATION</a:t>
+            </a:r>
+            <a:endParaRPr lang="he-IL" dirty="0" smtClean="0"/>
+          </a:p>
+          <a:p>
+            <a:pPr lvl="1" algn="r" rtl="1"/>
+            <a:r>
+              <a:rPr lang="he-IL" dirty="0" smtClean="0"/>
+              <a:t>מנגנון להעברת מיידע , בניית </a:t>
+            </a:r>
+            <a:r>
+              <a:rPr lang="he-IL" dirty="0" err="1" smtClean="0"/>
+              <a:t>פק</a:t>
+            </a:r>
+            <a:r>
+              <a:rPr lang="he-IL" dirty="0" err="1"/>
+              <a:t>ט</a:t>
+            </a:r>
+            <a:r>
+              <a:rPr lang="he-IL" dirty="0" err="1" smtClean="0"/>
+              <a:t>ות</a:t>
+            </a:r>
+            <a:r>
+              <a:rPr lang="he-IL" dirty="0" smtClean="0"/>
+              <a:t> ומימוש חלקי של פרוטוקולים בסיסיים:</a:t>
+            </a:r>
+            <a:r>
+              <a:rPr lang="en-US" dirty="0" smtClean="0"/>
+              <a:t>connect/disconnect</a:t>
+            </a:r>
+            <a:r>
+              <a:rPr lang="he-IL" dirty="0" smtClean="0"/>
+              <a:t> </a:t>
+            </a:r>
+            <a:r>
+              <a:rPr lang="en-US" dirty="0" smtClean="0"/>
+              <a:t> scanning, beacon, keep-alive , rate scaling</a:t>
+            </a:r>
+            <a:endParaRPr lang="he-IL" dirty="0" smtClean="0"/>
+          </a:p>
+          <a:p>
+            <a:pPr lvl="1" algn="r" rtl="1"/>
+            <a:r>
+              <a:rPr lang="he-IL" dirty="0" smtClean="0"/>
+              <a:t>שמירה ופתיחה של סימולציה קיימת ל/מקובץ.</a:t>
+            </a:r>
+          </a:p>
+          <a:p>
+            <a:pPr algn="r" rtl="1"/>
+            <a:endParaRPr lang="he-IL" dirty="0"/>
+          </a:p>
+        </p:txBody>
+      </p:sp>
+      <p:sp>
+        <p:nvSpPr>
+          <p:cNvPr id="3" name="Title 2"/>
+          <p:cNvSpPr>
+            <a:spLocks noGrp="1"/>
+          </p:cNvSpPr>
+          <p:nvPr>
+            <p:ph type="title"/>
+          </p:nvPr>
+        </p:nvSpPr>
+        <p:spPr/>
+        <p:txBody>
+          <a:bodyPr/>
+          <a:lstStyle/>
+          <a:p>
+            <a:r>
+              <a:rPr lang="he-IL" dirty="0" smtClean="0"/>
+              <a:t>מה עשנו עד עכשיו</a:t>
+            </a:r>
+            <a:endParaRPr lang="en-US" dirty="0"/>
+          </a:p>
+        </p:txBody>
+      </p:sp>
+    </p:spTree>
+    <p:extLst>
+      <p:ext uri="{BB962C8B-B14F-4D97-AF65-F5344CB8AC3E}">
+        <p14:creationId xmlns:p14="http://schemas.microsoft.com/office/powerpoint/2010/main" val="1518886079"/>
+      </p:ext>
+    </p:extLst>
+  </p:cSld>
+  <p:clrMapOvr>
+    <a:masterClrMapping/>
+  </p:clrMapOvr>
+  <p:timing>
+    <p:tnLst>
+      <p:par>
+        <p:cTn id="1" dur="indefinite" restart="never" nodeType="tmRoot"/>
+      </p:par>
+    </p:tnLst>
+  </p:timing>
+</p:sld>
+</file>
+
+<file path=ppt/slides/slide21.xml><?xml version="1.0" encoding="utf-8"?>
+<p:sld xmlns:a="http://schemas.openxmlformats.org/drawingml/2006/main" xmlns:r="http://schemas.openxmlformats.org/officeDocument/2006/relationships" xmlns:p="http://schemas.openxmlformats.org/presentationml/2006/main">
+  <p:cSld>
+    <p:spTree>
+      <p:nvGrpSpPr>
+        <p:cNvPr id="1" name=""/>
+        <p:cNvGrpSpPr/>
+        <p:nvPr/>
+      </p:nvGrpSpPr>
+      <p:grpSpPr>
+        <a:xfrm>
+          <a:off x="0" y="0"/>
+          <a:ext cx="0" cy="0"/>
+          <a:chOff x="0" y="0"/>
+          <a:chExt cx="0" cy="0"/>
+        </a:xfrm>
+      </p:grpSpPr>
+      <p:sp>
+        <p:nvSpPr>
+          <p:cNvPr id="3" name="Title 2"/>
+          <p:cNvSpPr>
+            <a:spLocks noGrp="1"/>
+          </p:cNvSpPr>
+          <p:nvPr>
+            <p:ph type="title"/>
+          </p:nvPr>
+        </p:nvSpPr>
+        <p:spPr/>
+        <p:txBody>
+          <a:bodyPr/>
+          <a:lstStyle/>
+          <a:p>
+            <a:r>
+              <a:rPr lang="he-IL" dirty="0" smtClean="0"/>
+              <a:t>הצגת יעדים מעודכנים</a:t>
+            </a:r>
+            <a:endParaRPr lang="en-US" dirty="0"/>
+          </a:p>
+        </p:txBody>
+      </p:sp>
+      <p:pic>
+        <p:nvPicPr>
+          <p:cNvPr id="4" name="Picture 3"/>
+          <p:cNvPicPr>
+            <a:picLocks noChangeAspect="1"/>
+          </p:cNvPicPr>
+          <p:nvPr/>
+        </p:nvPicPr>
+        <p:blipFill>
+          <a:blip r:embed="rId3">
+            <a:extLst>
+              <a:ext uri="{28A0092B-C50C-407E-A947-70E740481C1C}">
+                <a14:useLocalDpi xmlns:a14="http://schemas.microsoft.com/office/drawing/2010/main" val="0"/>
+              </a:ext>
+            </a:extLst>
+          </a:blip>
+          <a:stretch>
+            <a:fillRect/>
+          </a:stretch>
+        </p:blipFill>
+        <p:spPr>
+          <a:xfrm>
+            <a:off x="0" y="2133600"/>
+            <a:ext cx="9144000" cy="4212404"/>
+          </a:xfrm>
+          <a:prstGeom prst="rect">
+            <a:avLst/>
+          </a:prstGeom>
+        </p:spPr>
+      </p:pic>
+    </p:spTree>
+    <p:extLst>
+      <p:ext uri="{BB962C8B-B14F-4D97-AF65-F5344CB8AC3E}">
+        <p14:creationId xmlns:p14="http://schemas.microsoft.com/office/powerpoint/2010/main" val="3281705225"/>
+      </p:ext>
+    </p:extLst>
+  </p:cSld>
+  <p:clrMapOvr>
+    <a:masterClrMapping/>
+  </p:clrMapOvr>
+  <p:timing>
+    <p:tnLst>
+      <p:par>
+        <p:cTn id="1" dur="indefinite" restart="never" nodeType="tmRoot"/>
+      </p:par>
+    </p:tnLst>
+  </p:timing>
+</p:sld>
+</file>
+
+<file path=ppt/slides/slide22.xml><?xml version="1.0" encoding="utf-8"?>
+<p:sld xmlns:a="http://schemas.openxmlformats.org/drawingml/2006/main" xmlns:r="http://schemas.openxmlformats.org/officeDocument/2006/relationships" xmlns:p="http://schemas.openxmlformats.org/presentationml/2006/main">
+  <p:cSld>
+    <p:spTree>
+      <p:nvGrpSpPr>
+        <p:cNvPr id="1" name=""/>
+        <p:cNvGrpSpPr/>
+        <p:nvPr/>
+      </p:nvGrpSpPr>
+      <p:grpSpPr>
+        <a:xfrm>
+          <a:off x="0" y="0"/>
+          <a:ext cx="0" cy="0"/>
+          <a:chOff x="0" y="0"/>
+          <a:chExt cx="0" cy="0"/>
+        </a:xfrm>
+      </p:grpSpPr>
+      <p:sp>
+        <p:nvSpPr>
+          <p:cNvPr id="2" name="Content Placeholder 1"/>
+          <p:cNvSpPr>
+            <a:spLocks noGrp="1"/>
+          </p:cNvSpPr>
+          <p:nvPr>
+            <p:ph idx="1"/>
+          </p:nvPr>
+        </p:nvSpPr>
+        <p:spPr/>
+        <p:txBody>
+          <a:bodyPr/>
+          <a:lstStyle/>
+          <a:p>
+            <a:pPr algn="l"/>
+            <a:r>
+              <a:rPr lang="en-US" dirty="0" smtClean="0"/>
+              <a:t>802.11 SPEC</a:t>
+            </a:r>
+          </a:p>
+          <a:p>
+            <a:pPr algn="l"/>
+            <a:endParaRPr lang="en-US" dirty="0" smtClean="0"/>
+          </a:p>
+          <a:p>
+            <a:pPr algn="l"/>
+            <a:r>
+              <a:rPr lang="en-US" dirty="0" err="1" smtClean="0"/>
+              <a:t>WiFi</a:t>
+            </a:r>
+            <a:r>
+              <a:rPr lang="en-US" dirty="0" smtClean="0"/>
+              <a:t> Alliance</a:t>
+            </a:r>
+          </a:p>
+          <a:p>
+            <a:pPr marL="0" indent="0" algn="l">
+              <a:buNone/>
+            </a:pPr>
+            <a:endParaRPr lang="en-US" dirty="0" smtClean="0"/>
+          </a:p>
+        </p:txBody>
+      </p:sp>
+      <p:sp>
+        <p:nvSpPr>
+          <p:cNvPr id="3" name="Title 2"/>
+          <p:cNvSpPr>
+            <a:spLocks noGrp="1"/>
+          </p:cNvSpPr>
+          <p:nvPr>
+            <p:ph type="title"/>
+          </p:nvPr>
+        </p:nvSpPr>
+        <p:spPr/>
+        <p:txBody>
+          <a:bodyPr/>
+          <a:lstStyle/>
+          <a:p>
+            <a:r>
+              <a:rPr lang="he-IL" dirty="0" smtClean="0"/>
+              <a:t>ביבליוגרפיה</a:t>
+            </a:r>
+            <a:endParaRPr lang="en-US" dirty="0"/>
+          </a:p>
+        </p:txBody>
+      </p:sp>
+    </p:spTree>
+    <p:extLst>
+      <p:ext uri="{BB962C8B-B14F-4D97-AF65-F5344CB8AC3E}">
+        <p14:creationId xmlns:p14="http://schemas.microsoft.com/office/powerpoint/2010/main" val="1224788635"/>
+      </p:ext>
+    </p:extLst>
+  </p:cSld>
+  <p:clrMapOvr>
+    <a:masterClrMapping/>
+  </p:clrMapOvr>
+  <p:timing>
+    <p:tnLst>
+      <p:par>
+        <p:cTn id="1" dur="indefinite" restart="never" nodeType="tmRoot"/>
+      </p:par>
+    </p:tnLst>
+  </p:timing>
+</p:sld>
+</file>
+
 <file path=ppt/slides/slide3.xml><?xml version="1.0" encoding="utf-8"?>
 <p:sld xmlns:a="http://schemas.openxmlformats.org/drawingml/2006/main" xmlns:r="http://schemas.openxmlformats.org/officeDocument/2006/relationships" xmlns:p="http://schemas.openxmlformats.org/presentationml/2006/main">
   <p:cSld>
@@ -11177,11 +12997,7 @@
             </a:r>
             <a:r>
               <a:rPr lang="he-IL" dirty="0" smtClean="0"/>
-              <a:t> בסביבה קיימת </a:t>
-            </a:r>
-            <a:r>
-              <a:rPr lang="he-IL" dirty="0" smtClean="0"/>
-              <a:t>ללא צורך ברכישת ציוד נוסף</a:t>
+              <a:t> בסביבה קיימת ללא צורך ברכישת ציוד נוסף</a:t>
             </a:r>
           </a:p>
           <a:p>
@@ -11202,7 +13018,6 @@
               <a:rPr lang="he-IL" dirty="0" smtClean="0"/>
               <a:t> אופטימלי/מעודף מבחינת ביצועיים </a:t>
             </a:r>
-            <a:endParaRPr lang="he-IL" dirty="0" smtClean="0"/>
           </a:p>
           <a:p>
             <a:pPr algn="r" rtl="1"/>
@@ -11212,15 +13027,7 @@
             <a:pPr algn="r" rtl="1"/>
             <a:r>
               <a:rPr lang="he-IL" dirty="0" smtClean="0"/>
-              <a:t>בניית סימולטור </a:t>
-            </a:r>
-            <a:r>
-              <a:rPr lang="he-IL" dirty="0" smtClean="0"/>
-              <a:t>של </a:t>
-            </a:r>
-            <a:r>
-              <a:rPr lang="he-IL" dirty="0" smtClean="0"/>
-              <a:t>תשתית </a:t>
+              <a:t>בניית סימולטור של תשתית </a:t>
             </a:r>
             <a:r>
               <a:rPr lang="en-US" dirty="0" err="1" smtClean="0"/>
@@ -11238,7 +13045,6 @@
               <a:rPr lang="he-IL" dirty="0" smtClean="0"/>
               <a:t>.</a:t>
             </a:r>
-            <a:endParaRPr lang="he-IL" dirty="0" smtClean="0"/>
           </a:p>
           <a:p>
             <a:pPr marL="0" indent="0" algn="r" rtl="1">
@@ -11545,11 +13351,7 @@
             <a:pPr algn="r" rtl="1"/>
             <a:r>
               <a:rPr lang="he-IL" dirty="0" smtClean="0"/>
-              <a:t>התרבות </a:t>
-            </a:r>
-            <a:r>
-              <a:rPr lang="he-IL" dirty="0" smtClean="0"/>
-              <a:t>של המשתמש.</a:t>
+              <a:t>התרבות של המשתמש.</a:t>
             </a:r>
             <a:endParaRPr lang="he-IL" dirty="0"/>
           </a:p>

</xml_diff>